<commit_message>
changed the order of the last slides
</commit_message>
<xml_diff>
--- a/etc/folienEclipseCon2013/ECE2013-mbeddr-schmierer_voelter.pptx
+++ b/etc/folienEclipseCon2013/ECE2013-mbeddr-schmierer_voelter.pptx
@@ -45,8 +45,8 @@
     <p:sldId id="478" r:id="rId36"/>
     <p:sldId id="479" r:id="rId37"/>
     <p:sldId id="480" r:id="rId38"/>
-    <p:sldId id="481" r:id="rId39"/>
-    <p:sldId id="488" r:id="rId40"/>
+    <p:sldId id="488" r:id="rId39"/>
+    <p:sldId id="481" r:id="rId40"/>
     <p:sldId id="482" r:id="rId41"/>
   </p:sldIdLst>
   <p:sldSz cx="9144000" cy="6858000" type="screen4x3"/>
@@ -232,7 +232,7 @@
             <a:fld id="{BA23DC7E-545F-4537-850F-CC5C2B410559}" type="datetimeFigureOut">
               <a:rPr lang="de-DE" smtClean="0"/>
               <a:pPr/>
-              <a:t>25/10/13</a:t>
+              <a:t>28.10.2013</a:t>
             </a:fld>
             <a:endParaRPr lang="de-DE"/>
           </a:p>
@@ -392,7 +392,7 @@
             <a:fld id="{F67A725A-9256-4EC5-8CDB-4CC5D97770DD}" type="slidenum">
               <a:rPr lang="de-DE" smtClean="0"/>
               <a:pPr/>
-              <a:t>‹Nr.›</a:t>
+              <a:t>‹#›</a:t>
             </a:fld>
             <a:endParaRPr lang="de-DE"/>
           </a:p>
@@ -401,7 +401,7 @@
     </p:spTree>
     <p:extLst>
       <p:ext uri="{BB962C8B-B14F-4D97-AF65-F5344CB8AC3E}">
-        <p14:creationId xmlns:p14="http://schemas.microsoft.com/office/powerpoint/2010/main" val="2083301213"/>
+        <p14:creationId xmlns:p14="http://schemas.microsoft.com/office/powerpoint/2010/main" xmlns="" val="2083301213"/>
       </p:ext>
     </p:extLst>
   </p:cSld>
@@ -3916,7 +3916,7 @@
             <a:fld id="{F67A725A-9256-4EC5-8CDB-4CC5D97770DD}" type="slidenum">
               <a:rPr lang="de-DE" smtClean="0"/>
               <a:pPr/>
-              <a:t>38</a:t>
+              <a:t>39</a:t>
             </a:fld>
             <a:endParaRPr lang="de-DE"/>
           </a:p>
@@ -6196,7 +6196,7 @@
     </p:spTree>
     <p:extLst>
       <p:ext uri="{BB962C8B-B14F-4D97-AF65-F5344CB8AC3E}">
-        <p14:creationId xmlns:p14="http://schemas.microsoft.com/office/powerpoint/2010/main" val="3849503778"/>
+        <p14:creationId xmlns:p14="http://schemas.microsoft.com/office/powerpoint/2010/main" xmlns="" val="3849503778"/>
       </p:ext>
     </p:extLst>
   </p:cSld>
@@ -6206,7 +6206,7 @@
   <p:timing>
     <p:tnLst>
       <p:par>
-        <p:cTn xmlns:p14="http://schemas.microsoft.com/office/powerpoint/2010/main" id="1" dur="indefinite" restart="never" nodeType="tmRoot"/>
+        <p:cTn id="1" dur="indefinite" restart="never" nodeType="tmRoot"/>
       </p:par>
     </p:tnLst>
   </p:timing>
@@ -6331,7 +6331,7 @@
     </p:spTree>
     <p:extLst>
       <p:ext uri="{BB962C8B-B14F-4D97-AF65-F5344CB8AC3E}">
-        <p14:creationId xmlns:p14="http://schemas.microsoft.com/office/powerpoint/2010/main" val="3242060718"/>
+        <p14:creationId xmlns:p14="http://schemas.microsoft.com/office/powerpoint/2010/main" xmlns="" val="3242060718"/>
       </p:ext>
     </p:extLst>
   </p:cSld>
@@ -6404,7 +6404,7 @@
             <a:fld id="{AA807A42-CF27-4B84-8583-18EBE418342E}" type="slidenum">
               <a:rPr lang="en-GB" noProof="0" smtClean="0"/>
               <a:pPr/>
-              <a:t>‹Nr.›</a:t>
+              <a:t>‹#›</a:t>
             </a:fld>
             <a:endParaRPr lang="en-GB" noProof="0" dirty="0"/>
           </a:p>
@@ -6836,7 +6836,7 @@
             <a:fld id="{AA807A42-CF27-4B84-8583-18EBE418342E}" type="slidenum">
               <a:rPr lang="en-GB" noProof="0" smtClean="0"/>
               <a:pPr/>
-              <a:t>‹Nr.›</a:t>
+              <a:t>‹#›</a:t>
             </a:fld>
             <a:endParaRPr lang="en-GB" noProof="0" dirty="0"/>
           </a:p>
@@ -7162,7 +7162,7 @@
             <a:fld id="{AA807A42-CF27-4B84-8583-18EBE418342E}" type="slidenum">
               <a:rPr lang="en-GB" noProof="0" smtClean="0"/>
               <a:pPr/>
-              <a:t>‹Nr.›</a:t>
+              <a:t>‹#›</a:t>
             </a:fld>
             <a:endParaRPr lang="en-GB" noProof="0" dirty="0"/>
           </a:p>
@@ -8570,7 +8570,7 @@
     </p:spTree>
     <p:extLst>
       <p:ext uri="{BB962C8B-B14F-4D97-AF65-F5344CB8AC3E}">
-        <p14:creationId xmlns:p14="http://schemas.microsoft.com/office/powerpoint/2010/main" val="2408415105"/>
+        <p14:creationId xmlns:p14="http://schemas.microsoft.com/office/powerpoint/2010/main" xmlns="" val="2408415105"/>
       </p:ext>
     </p:extLst>
   </p:cSld>
@@ -8580,7 +8580,7 @@
   <p:timing>
     <p:tnLst>
       <p:par>
-        <p:cTn xmlns:p14="http://schemas.microsoft.com/office/powerpoint/2010/main" id="1" dur="indefinite" restart="never" nodeType="tmRoot"/>
+        <p:cTn id="1" dur="indefinite" restart="never" nodeType="tmRoot"/>
       </p:par>
     </p:tnLst>
   </p:timing>
@@ -8817,7 +8817,7 @@
     </p:spTree>
     <p:extLst>
       <p:ext uri="{BB962C8B-B14F-4D97-AF65-F5344CB8AC3E}">
-        <p14:creationId xmlns:p14="http://schemas.microsoft.com/office/powerpoint/2010/main" val="336931444"/>
+        <p14:creationId xmlns:p14="http://schemas.microsoft.com/office/powerpoint/2010/main" xmlns="" val="336931444"/>
       </p:ext>
     </p:extLst>
   </p:cSld>
@@ -8827,7 +8827,7 @@
   <p:timing>
     <p:tnLst>
       <p:par>
-        <p:cTn xmlns:p14="http://schemas.microsoft.com/office/powerpoint/2010/main" id="1" dur="indefinite" restart="never" nodeType="tmRoot"/>
+        <p:cTn id="1" dur="indefinite" restart="never" nodeType="tmRoot"/>
       </p:par>
     </p:tnLst>
   </p:timing>
@@ -9071,7 +9071,7 @@
     </p:spTree>
     <p:extLst>
       <p:ext uri="{BB962C8B-B14F-4D97-AF65-F5344CB8AC3E}">
-        <p14:creationId xmlns:p14="http://schemas.microsoft.com/office/powerpoint/2010/main" val="1974033518"/>
+        <p14:creationId xmlns:p14="http://schemas.microsoft.com/office/powerpoint/2010/main" xmlns="" val="1974033518"/>
       </p:ext>
     </p:extLst>
   </p:cSld>
@@ -9081,7 +9081,7 @@
   <p:timing>
     <p:tnLst>
       <p:par>
-        <p:cTn xmlns:p14="http://schemas.microsoft.com/office/powerpoint/2010/main" id="1" dur="indefinite" restart="never" nodeType="tmRoot"/>
+        <p:cTn id="1" dur="indefinite" restart="never" nodeType="tmRoot"/>
       </p:par>
     </p:tnLst>
   </p:timing>
@@ -9151,7 +9151,7 @@
             <a:fld id="{AA807A42-CF27-4B84-8583-18EBE418342E}" type="slidenum">
               <a:rPr lang="en-GB" noProof="0" smtClean="0"/>
               <a:pPr/>
-              <a:t>‹Nr.›</a:t>
+              <a:t>‹#›</a:t>
             </a:fld>
             <a:endParaRPr lang="en-GB" noProof="0" dirty="0"/>
           </a:p>
@@ -9423,7 +9423,7 @@
             <a:fld id="{AA807A42-CF27-4B84-8583-18EBE418342E}" type="slidenum">
               <a:rPr lang="en-GB" noProof="0" smtClean="0"/>
               <a:pPr/>
-              <a:t>‹Nr.›</a:t>
+              <a:t>‹#›</a:t>
             </a:fld>
             <a:endParaRPr lang="en-GB" noProof="0" dirty="0"/>
           </a:p>
@@ -9696,7 +9696,7 @@
             <a:fld id="{AA807A42-CF27-4B84-8583-18EBE418342E}" type="slidenum">
               <a:rPr lang="en-GB" noProof="0" smtClean="0"/>
               <a:pPr/>
-              <a:t>‹Nr.›</a:t>
+              <a:t>‹#›</a:t>
             </a:fld>
             <a:endParaRPr lang="en-GB" noProof="0" dirty="0"/>
           </a:p>
@@ -9969,7 +9969,7 @@
             <a:fld id="{AA807A42-CF27-4B84-8583-18EBE418342E}" type="slidenum">
               <a:rPr lang="en-GB" noProof="0" smtClean="0"/>
               <a:pPr/>
-              <a:t>‹Nr.›</a:t>
+              <a:t>‹#›</a:t>
             </a:fld>
             <a:endParaRPr lang="en-GB" noProof="0" dirty="0"/>
           </a:p>
@@ -10242,7 +10242,7 @@
             <a:fld id="{AA807A42-CF27-4B84-8583-18EBE418342E}" type="slidenum">
               <a:rPr lang="en-GB" noProof="0" smtClean="0"/>
               <a:pPr/>
-              <a:t>‹Nr.›</a:t>
+              <a:t>‹#›</a:t>
             </a:fld>
             <a:endParaRPr lang="en-GB" noProof="0" dirty="0"/>
           </a:p>
@@ -10454,7 +10454,7 @@
             <a:fld id="{AA807A42-CF27-4B84-8583-18EBE418342E}" type="slidenum">
               <a:rPr lang="en-GB" noProof="0" smtClean="0"/>
               <a:pPr/>
-              <a:t>‹Nr.›</a:t>
+              <a:t>‹#›</a:t>
             </a:fld>
             <a:endParaRPr lang="en-GB" noProof="0" dirty="0"/>
           </a:p>
@@ -10463,7 +10463,7 @@
     </p:spTree>
     <p:extLst>
       <p:ext uri="{BB962C8B-B14F-4D97-AF65-F5344CB8AC3E}">
-        <p14:creationId xmlns:p14="http://schemas.microsoft.com/office/powerpoint/2010/main" val="3829165557"/>
+        <p14:creationId xmlns:p14="http://schemas.microsoft.com/office/powerpoint/2010/main" xmlns="" val="3829165557"/>
       </p:ext>
     </p:extLst>
   </p:cSld>
@@ -10486,7 +10486,7 @@
   <p:timing>
     <p:tnLst>
       <p:par>
-        <p:cTn xmlns:p14="http://schemas.microsoft.com/office/powerpoint/2010/main" id="1" dur="indefinite" restart="never" nodeType="tmRoot"/>
+        <p:cTn id="1" dur="indefinite" restart="never" nodeType="tmRoot"/>
       </p:par>
     </p:tnLst>
   </p:timing>
@@ -10901,10 +10901,10 @@
           <p:nvPr/>
         </p:nvPicPr>
         <p:blipFill rotWithShape="1">
-          <a:blip r:embed="rId2">
+          <a:blip r:embed="rId2" cstate="print">
             <a:extLst>
               <a:ext uri="{28A0092B-C50C-407E-A947-70E740481C1C}">
-                <a14:useLocalDpi xmlns:a14="http://schemas.microsoft.com/office/drawing/2010/main" val="0"/>
+                <a14:useLocalDpi xmlns:a14="http://schemas.microsoft.com/office/drawing/2010/main" xmlns="" val="0"/>
               </a:ext>
             </a:extLst>
           </a:blip>
@@ -10926,13 +10926,13 @@
   <p:clrMapOvr>
     <a:masterClrMapping/>
   </p:clrMapOvr>
-  <p:transition xmlns:p14="http://schemas.microsoft.com/office/powerpoint/2010/main">
+  <p:transition>
     <p:fade/>
   </p:transition>
   <p:timing>
     <p:tnLst>
       <p:par>
-        <p:cTn xmlns:p14="http://schemas.microsoft.com/office/powerpoint/2010/main" id="1" dur="indefinite" restart="never" nodeType="tmRoot"/>
+        <p:cTn id="1" dur="indefinite" restart="never" nodeType="tmRoot"/>
       </p:par>
     </p:tnLst>
   </p:timing>
@@ -11203,7 +11203,7 @@
   <p:timing>
     <p:tnLst>
       <p:par>
-        <p:cTn xmlns:p14="http://schemas.microsoft.com/office/powerpoint/2010/main" id="1" dur="indefinite" restart="never" nodeType="tmRoot"/>
+        <p:cTn id="1" dur="indefinite" restart="never" nodeType="tmRoot"/>
       </p:par>
     </p:tnLst>
   </p:timing>
@@ -11746,7 +11746,7 @@
   <p:timing>
     <p:tnLst>
       <p:par>
-        <p:cTn xmlns:p14="http://schemas.microsoft.com/office/powerpoint/2010/main" id="1" dur="indefinite" restart="never" nodeType="tmRoot"/>
+        <p:cTn id="1" dur="indefinite" restart="never" nodeType="tmRoot"/>
       </p:par>
     </p:tnLst>
   </p:timing>
@@ -11886,20 +11886,20 @@
     </p:spTree>
     <p:extLst>
       <p:ext uri="{BB962C8B-B14F-4D97-AF65-F5344CB8AC3E}">
-        <p14:creationId xmlns:p14="http://schemas.microsoft.com/office/powerpoint/2010/main" val="1244883522"/>
+        <p14:creationId xmlns:p14="http://schemas.microsoft.com/office/powerpoint/2010/main" xmlns="" val="1244883522"/>
       </p:ext>
     </p:extLst>
   </p:cSld>
   <p:clrMapOvr>
     <a:masterClrMapping/>
   </p:clrMapOvr>
-  <p:transition xmlns:p14="http://schemas.microsoft.com/office/powerpoint/2010/main">
+  <p:transition>
     <p:fade/>
   </p:transition>
   <p:timing>
     <p:tnLst>
       <p:par>
-        <p:cTn xmlns:p14="http://schemas.microsoft.com/office/powerpoint/2010/main" id="1" dur="indefinite" restart="never" nodeType="tmRoot"/>
+        <p:cTn id="1" dur="indefinite" restart="never" nodeType="tmRoot"/>
       </p:par>
     </p:tnLst>
   </p:timing>
@@ -12528,7 +12528,7 @@
   <p:timing>
     <p:tnLst>
       <p:par>
-        <p:cTn xmlns:p14="http://schemas.microsoft.com/office/powerpoint/2010/main" id="1" dur="indefinite" restart="never" nodeType="tmRoot"/>
+        <p:cTn id="1" dur="indefinite" restart="never" nodeType="tmRoot"/>
       </p:par>
     </p:tnLst>
   </p:timing>
@@ -13314,7 +13314,7 @@
   <p:timing>
     <p:tnLst>
       <p:par>
-        <p:cTn xmlns:p14="http://schemas.microsoft.com/office/powerpoint/2010/main" id="1" dur="indefinite" restart="never" nodeType="tmRoot"/>
+        <p:cTn id="1" dur="indefinite" restart="never" nodeType="tmRoot"/>
       </p:par>
     </p:tnLst>
   </p:timing>
@@ -13510,7 +13510,7 @@
           <a:blip r:embed="rId2" cstate="print">
             <a:extLst>
               <a:ext uri="{BEBA8EAE-BF5A-486C-A8C5-ECC9F3942E4B}">
-                <a14:imgProps xmlns:a14="http://schemas.microsoft.com/office/drawing/2010/main">
+                <a14:imgProps xmlns:a14="http://schemas.microsoft.com/office/drawing/2010/main" xmlns="">
                   <a14:imgLayer r:embed="rId3">
                     <a14:imgEffect>
                       <a14:saturation sat="0"/>
@@ -13840,7 +13840,7 @@
   <p:timing>
     <p:tnLst>
       <p:par>
-        <p:cTn xmlns:p14="http://schemas.microsoft.com/office/powerpoint/2010/main" id="1" dur="indefinite" restart="never" nodeType="tmRoot"/>
+        <p:cTn id="1" dur="indefinite" restart="never" nodeType="tmRoot"/>
       </p:par>
     </p:tnLst>
   </p:timing>
@@ -14048,7 +14048,7 @@
   <p:timing>
     <p:tnLst>
       <p:par>
-        <p:cTn xmlns:p14="http://schemas.microsoft.com/office/powerpoint/2010/main" id="1" dur="indefinite" restart="never" nodeType="tmRoot"/>
+        <p:cTn id="1" dur="indefinite" restart="never" nodeType="tmRoot"/>
       </p:par>
     </p:tnLst>
   </p:timing>
@@ -14260,7 +14260,7 @@
   <p:timing>
     <p:tnLst>
       <p:par>
-        <p:cTn xmlns:p14="http://schemas.microsoft.com/office/powerpoint/2010/main" id="1" dur="indefinite" restart="never" nodeType="tmRoot"/>
+        <p:cTn id="1" dur="indefinite" restart="never" nodeType="tmRoot"/>
       </p:par>
     </p:tnLst>
   </p:timing>
@@ -14640,7 +14640,7 @@
   <p:timing>
     <p:tnLst>
       <p:par>
-        <p:cTn xmlns:p14="http://schemas.microsoft.com/office/powerpoint/2010/main" id="1" dur="indefinite" restart="never" nodeType="tmRoot"/>
+        <p:cTn id="1" dur="indefinite" restart="never" nodeType="tmRoot"/>
       </p:par>
     </p:tnLst>
   </p:timing>
@@ -14852,7 +14852,7 @@
   <p:timing>
     <p:tnLst>
       <p:par>
-        <p:cTn xmlns:p14="http://schemas.microsoft.com/office/powerpoint/2010/main" id="1" dur="indefinite" restart="never" nodeType="tmRoot"/>
+        <p:cTn id="1" dur="indefinite" restart="never" nodeType="tmRoot"/>
       </p:par>
     </p:tnLst>
   </p:timing>
@@ -14992,20 +14992,20 @@
     </p:spTree>
     <p:extLst>
       <p:ext uri="{BB962C8B-B14F-4D97-AF65-F5344CB8AC3E}">
-        <p14:creationId xmlns:p14="http://schemas.microsoft.com/office/powerpoint/2010/main" val="1244883522"/>
+        <p14:creationId xmlns:p14="http://schemas.microsoft.com/office/powerpoint/2010/main" xmlns="" val="1244883522"/>
       </p:ext>
     </p:extLst>
   </p:cSld>
   <p:clrMapOvr>
     <a:masterClrMapping/>
   </p:clrMapOvr>
-  <p:transition xmlns:p14="http://schemas.microsoft.com/office/powerpoint/2010/main">
+  <p:transition>
     <p:fade/>
   </p:transition>
   <p:timing>
     <p:tnLst>
       <p:par>
-        <p:cTn xmlns:p14="http://schemas.microsoft.com/office/powerpoint/2010/main" id="1" dur="indefinite" restart="never" nodeType="tmRoot"/>
+        <p:cTn id="1" dur="indefinite" restart="never" nodeType="tmRoot"/>
       </p:par>
     </p:tnLst>
   </p:timing>
@@ -15263,7 +15263,7 @@
   <p:timing>
     <p:tnLst>
       <p:par>
-        <p:cTn xmlns:p14="http://schemas.microsoft.com/office/powerpoint/2010/main" id="1" dur="indefinite" restart="never" nodeType="tmRoot"/>
+        <p:cTn id="1" dur="indefinite" restart="never" nodeType="tmRoot"/>
       </p:par>
     </p:tnLst>
   </p:timing>
@@ -15403,20 +15403,20 @@
     </p:spTree>
     <p:extLst>
       <p:ext uri="{BB962C8B-B14F-4D97-AF65-F5344CB8AC3E}">
-        <p14:creationId xmlns:p14="http://schemas.microsoft.com/office/powerpoint/2010/main" val="1244883522"/>
+        <p14:creationId xmlns:p14="http://schemas.microsoft.com/office/powerpoint/2010/main" xmlns="" val="1244883522"/>
       </p:ext>
     </p:extLst>
   </p:cSld>
   <p:clrMapOvr>
     <a:masterClrMapping/>
   </p:clrMapOvr>
-  <p:transition xmlns:p14="http://schemas.microsoft.com/office/powerpoint/2010/main">
+  <p:transition>
     <p:fade/>
   </p:transition>
   <p:timing>
     <p:tnLst>
       <p:par>
-        <p:cTn xmlns:p14="http://schemas.microsoft.com/office/powerpoint/2010/main" id="1" dur="indefinite" restart="never" nodeType="tmRoot"/>
+        <p:cTn id="1" dur="indefinite" restart="never" nodeType="tmRoot"/>
       </p:par>
     </p:tnLst>
   </p:timing>
@@ -15611,13 +15611,13 @@
   <p:clrMapOvr>
     <a:masterClrMapping/>
   </p:clrMapOvr>
-  <p:transition xmlns:p14="http://schemas.microsoft.com/office/powerpoint/2010/main">
+  <p:transition>
     <p:fade/>
   </p:transition>
   <p:timing>
     <p:tnLst>
       <p:par>
-        <p:cTn xmlns:p14="http://schemas.microsoft.com/office/powerpoint/2010/main" id="1" dur="indefinite" restart="never" nodeType="tmRoot"/>
+        <p:cTn id="1" dur="indefinite" restart="never" nodeType="tmRoot"/>
       </p:par>
     </p:tnLst>
   </p:timing>
@@ -16993,7 +16993,7 @@
   <p:timing>
     <p:tnLst>
       <p:par>
-        <p:cTn xmlns:p14="http://schemas.microsoft.com/office/powerpoint/2010/main" id="1" dur="indefinite" restart="never" nodeType="tmRoot">
+        <p:cTn id="1" dur="indefinite" restart="never" nodeType="tmRoot">
           <p:childTnLst>
             <p:seq concurrent="1" nextAc="seek">
               <p:cTn id="2" dur="indefinite" nodeType="mainSeq">
@@ -18146,7 +18146,7 @@
   <p:timing>
     <p:tnLst>
       <p:par>
-        <p:cTn xmlns:p14="http://schemas.microsoft.com/office/powerpoint/2010/main" id="1" dur="indefinite" restart="never" nodeType="tmRoot"/>
+        <p:cTn id="1" dur="indefinite" restart="never" nodeType="tmRoot"/>
       </p:par>
     </p:tnLst>
   </p:timing>
@@ -19567,7 +19567,7 @@
   <p:timing>
     <p:tnLst>
       <p:par>
-        <p:cTn xmlns:p14="http://schemas.microsoft.com/office/powerpoint/2010/main" id="1" dur="indefinite" restart="never" nodeType="tmRoot">
+        <p:cTn id="1" dur="indefinite" restart="never" nodeType="tmRoot">
           <p:childTnLst>
             <p:seq concurrent="1" nextAc="seek">
               <p:cTn id="2" dur="indefinite" nodeType="mainSeq">
@@ -20551,7 +20551,7 @@
   <p:timing>
     <p:tnLst>
       <p:par>
-        <p:cTn xmlns:p14="http://schemas.microsoft.com/office/powerpoint/2010/main" id="1" dur="indefinite" restart="never" nodeType="tmRoot">
+        <p:cTn id="1" dur="indefinite" restart="never" nodeType="tmRoot">
           <p:childTnLst>
             <p:seq concurrent="1" nextAc="seek">
               <p:cTn id="2" dur="indefinite" nodeType="mainSeq">
@@ -21032,7 +21032,7 @@
   <p:timing>
     <p:tnLst>
       <p:par>
-        <p:cTn xmlns:p14="http://schemas.microsoft.com/office/powerpoint/2010/main" id="1" dur="indefinite" restart="never" nodeType="tmRoot"/>
+        <p:cTn id="1" dur="indefinite" restart="never" nodeType="tmRoot"/>
       </p:par>
     </p:tnLst>
   </p:timing>
@@ -23212,7 +23212,7 @@
   <p:timing>
     <p:tnLst>
       <p:par>
-        <p:cTn xmlns:p14="http://schemas.microsoft.com/office/powerpoint/2010/main" id="1" dur="indefinite" restart="never" nodeType="tmRoot">
+        <p:cTn id="1" dur="indefinite" restart="never" nodeType="tmRoot">
           <p:childTnLst>
             <p:seq concurrent="1" nextAc="seek">
               <p:cTn id="2" dur="indefinite" nodeType="mainSeq">
@@ -24033,7 +24033,7 @@
   <p:timing>
     <p:tnLst>
       <p:par>
-        <p:cTn xmlns:p14="http://schemas.microsoft.com/office/powerpoint/2010/main" id="1" dur="indefinite" restart="never" nodeType="tmRoot">
+        <p:cTn id="1" dur="indefinite" restart="never" nodeType="tmRoot">
           <p:childTnLst>
             <p:seq concurrent="1" nextAc="seek">
               <p:cTn id="2" dur="indefinite" nodeType="mainSeq">
@@ -24441,20 +24441,20 @@
     </p:spTree>
     <p:extLst>
       <p:ext uri="{BB962C8B-B14F-4D97-AF65-F5344CB8AC3E}">
-        <p14:creationId xmlns:p14="http://schemas.microsoft.com/office/powerpoint/2010/main" val="3800702723"/>
+        <p14:creationId xmlns:p14="http://schemas.microsoft.com/office/powerpoint/2010/main" xmlns="" val="3800702723"/>
       </p:ext>
     </p:extLst>
   </p:cSld>
   <p:clrMapOvr>
     <a:masterClrMapping/>
   </p:clrMapOvr>
-  <p:transition xmlns:p14="http://schemas.microsoft.com/office/powerpoint/2010/main">
+  <p:transition>
     <p:fade/>
   </p:transition>
   <p:timing>
     <p:tnLst>
       <p:par>
-        <p:cTn xmlns:p14="http://schemas.microsoft.com/office/powerpoint/2010/main" id="1" dur="indefinite" restart="never" nodeType="tmRoot"/>
+        <p:cTn id="1" dur="indefinite" restart="never" nodeType="tmRoot"/>
       </p:par>
     </p:tnLst>
   </p:timing>
@@ -24700,7 +24700,7 @@
   <p:timing>
     <p:tnLst>
       <p:par>
-        <p:cTn xmlns:p14="http://schemas.microsoft.com/office/powerpoint/2010/main" id="1" dur="indefinite" restart="never" nodeType="tmRoot"/>
+        <p:cTn id="1" dur="indefinite" restart="never" nodeType="tmRoot"/>
       </p:par>
     </p:tnLst>
   </p:timing>
@@ -24984,7 +24984,7 @@
   <p:timing>
     <p:tnLst>
       <p:par>
-        <p:cTn xmlns:p14="http://schemas.microsoft.com/office/powerpoint/2010/main" id="1" dur="indefinite" restart="never" nodeType="tmRoot">
+        <p:cTn id="1" dur="indefinite" restart="never" nodeType="tmRoot">
           <p:childTnLst>
             <p:seq concurrent="1" nextAc="seek">
               <p:cTn id="2" dur="indefinite" nodeType="mainSeq">
@@ -25523,7 +25523,7 @@
   <p:timing>
     <p:tnLst>
       <p:par>
-        <p:cTn xmlns:p14="http://schemas.microsoft.com/office/powerpoint/2010/main" id="1" dur="indefinite" restart="never" nodeType="tmRoot">
+        <p:cTn id="1" dur="indefinite" restart="never" nodeType="tmRoot">
           <p:childTnLst>
             <p:seq concurrent="1" nextAc="seek">
               <p:cTn id="2" dur="indefinite" nodeType="mainSeq">
@@ -26009,7 +26009,7 @@
   <p:timing>
     <p:tnLst>
       <p:par>
-        <p:cTn xmlns:p14="http://schemas.microsoft.com/office/powerpoint/2010/main" id="1" dur="indefinite" restart="never" nodeType="tmRoot"/>
+        <p:cTn id="1" dur="indefinite" restart="never" nodeType="tmRoot"/>
       </p:par>
     </p:tnLst>
   </p:timing>
@@ -26296,7 +26296,7 @@
   <p:timing>
     <p:tnLst>
       <p:par>
-        <p:cTn xmlns:p14="http://schemas.microsoft.com/office/powerpoint/2010/main" id="1" dur="indefinite" restart="never" nodeType="tmRoot"/>
+        <p:cTn id="1" dur="indefinite" restart="never" nodeType="tmRoot"/>
       </p:par>
     </p:tnLst>
   </p:timing>
@@ -27390,7 +27390,7 @@
   <p:timing>
     <p:tnLst>
       <p:par>
-        <p:cTn xmlns:p14="http://schemas.microsoft.com/office/powerpoint/2010/main" id="1" dur="indefinite" restart="never" nodeType="tmRoot">
+        <p:cTn id="1" dur="indefinite" restart="never" nodeType="tmRoot">
           <p:childTnLst>
             <p:seq concurrent="1" nextAc="seek">
               <p:cTn id="2" dur="indefinite" nodeType="mainSeq">
@@ -28138,7 +28138,7 @@
   <p:timing>
     <p:tnLst>
       <p:par>
-        <p:cTn xmlns:p14="http://schemas.microsoft.com/office/powerpoint/2010/main" id="1" dur="indefinite" restart="never" nodeType="tmRoot">
+        <p:cTn id="1" dur="indefinite" restart="never" nodeType="tmRoot">
           <p:childTnLst>
             <p:seq concurrent="1" nextAc="seek">
               <p:cTn id="2" dur="indefinite" nodeType="mainSeq">
@@ -29086,7 +29086,7 @@
   <p:timing>
     <p:tnLst>
       <p:par>
-        <p:cTn xmlns:p14="http://schemas.microsoft.com/office/powerpoint/2010/main" id="1" dur="indefinite" restart="never" nodeType="tmRoot">
+        <p:cTn id="1" dur="indefinite" restart="never" nodeType="tmRoot">
           <p:childTnLst>
             <p:seq concurrent="1" nextAc="seek">
               <p:cTn id="2" dur="indefinite" nodeType="mainSeq">
@@ -29415,6 +29415,321 @@
           <a:p>
             <a:r>
               <a:rPr lang="en-GB" dirty="0" smtClean="0"/>
+              <a:t>MPS.</a:t>
+            </a:r>
+          </a:p>
+          <a:p>
+            <a:r>
+              <a:rPr lang="en-GB" dirty="0" err="1" smtClean="0"/>
+              <a:t>Mbeddr</a:t>
+            </a:r>
+            <a:r>
+              <a:rPr lang="en-GB" dirty="0" smtClean="0"/>
+              <a:t> + </a:t>
+            </a:r>
+            <a:r>
+              <a:rPr lang="en-GB" dirty="0" err="1" smtClean="0"/>
+              <a:t>autosar</a:t>
+            </a:r>
+            <a:endParaRPr lang="en-GB" dirty="0" smtClean="0"/>
+          </a:p>
+        </p:txBody>
+      </p:sp>
+      <p:sp>
+        <p:nvSpPr>
+          <p:cNvPr id="9" name="Textplatzhalter 4"/>
+          <p:cNvSpPr>
+            <a:spLocks noGrp="1"/>
+          </p:cNvSpPr>
+          <p:nvPr>
+            <p:ph type="body" sz="quarter" idx="14"/>
+          </p:nvPr>
+        </p:nvSpPr>
+        <p:spPr>
+          <a:xfrm>
+            <a:off x="465138" y="1611038"/>
+            <a:ext cx="11263312" cy="4861700"/>
+          </a:xfrm>
+        </p:spPr>
+        <p:txBody>
+          <a:bodyPr/>
+          <a:lstStyle/>
+          <a:p>
+            <a:pPr marL="266700" indent="-266700">
+              <a:spcBef>
+                <a:spcPct val="0"/>
+              </a:spcBef>
+            </a:pPr>
+            <a:endParaRPr lang="en-US" dirty="0" smtClean="0">
+              <a:ea typeface="ＭＳ Ｐゴシック" charset="-128"/>
+            </a:endParaRPr>
+          </a:p>
+          <a:p>
+            <a:pPr marL="266700" indent="-266700">
+              <a:spcBef>
+                <a:spcPct val="0"/>
+              </a:spcBef>
+              <a:buFont typeface="Symbol" pitchFamily="18" charset="2"/>
+              <a:buChar char="-"/>
+            </a:pPr>
+            <a:endParaRPr lang="en-US" dirty="0">
+              <a:ea typeface="ＭＳ Ｐゴシック" charset="-128"/>
+            </a:endParaRPr>
+          </a:p>
+          <a:p>
+            <a:pPr>
+              <a:buFontTx/>
+              <a:buChar char="-"/>
+            </a:pPr>
+            <a:endParaRPr lang="en-US" dirty="0" smtClean="0"/>
+          </a:p>
+          <a:p>
+            <a:endParaRPr lang="de-DE" dirty="0"/>
+          </a:p>
+        </p:txBody>
+      </p:sp>
+      <p:sp>
+        <p:nvSpPr>
+          <p:cNvPr id="10" name="Rechteck 8"/>
+          <p:cNvSpPr/>
+          <p:nvPr/>
+        </p:nvSpPr>
+        <p:spPr>
+          <a:xfrm>
+            <a:off x="1832262" y="2458800"/>
+            <a:ext cx="7992888" cy="216024"/>
+          </a:xfrm>
+          <a:prstGeom prst="rect">
+            <a:avLst/>
+          </a:prstGeom>
+          <a:solidFill>
+            <a:schemeClr val="bg1"/>
+          </a:solidFill>
+          <a:ln>
+            <a:noFill/>
+          </a:ln>
+          <a:effectLst/>
+        </p:spPr>
+        <p:style>
+          <a:lnRef idx="1">
+            <a:schemeClr val="accent1"/>
+          </a:lnRef>
+          <a:fillRef idx="3">
+            <a:schemeClr val="accent1"/>
+          </a:fillRef>
+          <a:effectRef idx="2">
+            <a:schemeClr val="accent1"/>
+          </a:effectRef>
+          <a:fontRef idx="minor">
+            <a:schemeClr val="lt1"/>
+          </a:fontRef>
+        </p:style>
+        <p:txBody>
+          <a:bodyPr rtlCol="0" anchor="ctr"/>
+          <a:lstStyle/>
+          <a:p>
+            <a:pPr algn="ctr"/>
+            <a:endParaRPr lang="de-DE" sz="4000">
+              <a:latin typeface="Calibri"/>
+              <a:cs typeface="Calibri"/>
+            </a:endParaRPr>
+          </a:p>
+        </p:txBody>
+      </p:sp>
+      <p:sp>
+        <p:nvSpPr>
+          <p:cNvPr id="12" name="Textplatzhalter 3"/>
+          <p:cNvSpPr txBox="1">
+            <a:spLocks/>
+          </p:cNvSpPr>
+          <p:nvPr/>
+        </p:nvSpPr>
+        <p:spPr>
+          <a:xfrm>
+            <a:off x="2865360" y="3378210"/>
+            <a:ext cx="7161268" cy="960437"/>
+          </a:xfrm>
+          <a:prstGeom prst="rect">
+            <a:avLst/>
+          </a:prstGeom>
+        </p:spPr>
+        <p:txBody>
+          <a:bodyPr lIns="0" tIns="0" rIns="0" bIns="0">
+            <a:noAutofit/>
+          </a:bodyPr>
+          <a:lstStyle/>
+          <a:p>
+            <a:pPr marL="0" marR="0" lvl="0" indent="0" algn="l" defTabSz="914400" rtl="0" eaLnBrk="1" fontAlgn="auto" latinLnBrk="0" hangingPunct="1">
+              <a:lnSpc>
+                <a:spcPts val="2800"/>
+              </a:lnSpc>
+              <a:spcBef>
+                <a:spcPts val="0"/>
+              </a:spcBef>
+              <a:spcAft>
+                <a:spcPts val="0"/>
+              </a:spcAft>
+              <a:buClrTx/>
+              <a:buSzTx/>
+              <a:buFont typeface="Arial" pitchFamily="34" charset="0"/>
+              <a:buNone/>
+              <a:tabLst/>
+              <a:defRPr/>
+            </a:pPr>
+            <a:r>
+              <a:rPr kumimoji="0" lang="en-GB" sz="8800" b="1" i="0" u="none" strike="noStrike" kern="1200" cap="all" spc="0" normalizeH="0" baseline="0" noProof="0" smtClean="0">
+                <a:ln>
+                  <a:noFill/>
+                </a:ln>
+                <a:solidFill>
+                  <a:schemeClr val="bg2"/>
+                </a:solidFill>
+                <a:effectLst/>
+                <a:uLnTx/>
+                <a:uFillTx/>
+                <a:latin typeface="+mn-lt"/>
+                <a:ea typeface="+mn-ea"/>
+                <a:cs typeface="+mn-cs"/>
+              </a:rPr>
+              <a:t>DEMO</a:t>
+            </a:r>
+            <a:endParaRPr kumimoji="0" lang="en-GB" sz="8800" b="1" i="0" u="none" strike="noStrike" kern="1200" cap="all" spc="0" normalizeH="0" baseline="0" noProof="0" dirty="0" smtClean="0">
+              <a:ln>
+                <a:noFill/>
+              </a:ln>
+              <a:solidFill>
+                <a:schemeClr val="bg2"/>
+              </a:solidFill>
+              <a:effectLst/>
+              <a:uLnTx/>
+              <a:uFillTx/>
+              <a:latin typeface="+mn-lt"/>
+              <a:ea typeface="+mn-ea"/>
+              <a:cs typeface="+mn-cs"/>
+            </a:endParaRPr>
+          </a:p>
+        </p:txBody>
+      </p:sp>
+    </p:spTree>
+  </p:cSld>
+  <p:clrMapOvr>
+    <a:masterClrMapping/>
+  </p:clrMapOvr>
+  <p:timing>
+    <p:tnLst>
+      <p:par>
+        <p:cTn id="1" dur="indefinite" restart="never" nodeType="tmRoot"/>
+      </p:par>
+    </p:tnLst>
+  </p:timing>
+</p:sld>
+</file>
+
+<file path=ppt/slides/slide39.xml><?xml version="1.0" encoding="utf-8"?>
+<p:sld xmlns:a="http://schemas.openxmlformats.org/drawingml/2006/main" xmlns:r="http://schemas.openxmlformats.org/officeDocument/2006/relationships" xmlns:p="http://schemas.openxmlformats.org/presentationml/2006/main">
+  <p:cSld>
+    <p:spTree>
+      <p:nvGrpSpPr>
+        <p:cNvPr id="1" name=""/>
+        <p:cNvGrpSpPr/>
+        <p:nvPr/>
+      </p:nvGrpSpPr>
+      <p:grpSpPr>
+        <a:xfrm>
+          <a:off x="0" y="0"/>
+          <a:ext cx="0" cy="0"/>
+          <a:chOff x="0" y="0"/>
+          <a:chExt cx="0" cy="0"/>
+        </a:xfrm>
+      </p:grpSpPr>
+      <p:sp>
+        <p:nvSpPr>
+          <p:cNvPr id="6" name="Fußzeilenplatzhalter 1"/>
+          <p:cNvSpPr>
+            <a:spLocks noGrp="1"/>
+          </p:cNvSpPr>
+          <p:nvPr>
+            <p:ph type="ftr" sz="quarter" idx="10"/>
+          </p:nvPr>
+        </p:nvSpPr>
+        <p:spPr>
+          <a:xfrm>
+            <a:off x="465138" y="6508573"/>
+            <a:ext cx="4021247" cy="331787"/>
+          </a:xfrm>
+        </p:spPr>
+        <p:txBody>
+          <a:bodyPr/>
+          <a:lstStyle/>
+          <a:p>
+            <a:pPr algn="l"/>
+            <a:r>
+              <a:rPr lang="de-DE" dirty="0" err="1" smtClean="0"/>
+              <a:t>mbeddr</a:t>
+            </a:r>
+            <a:r>
+              <a:rPr lang="de-DE" dirty="0" smtClean="0"/>
+              <a:t>, 29.10.2013</a:t>
+            </a:r>
+            <a:endParaRPr lang="de-DE" dirty="0"/>
+          </a:p>
+        </p:txBody>
+      </p:sp>
+      <p:sp>
+        <p:nvSpPr>
+          <p:cNvPr id="7" name="Foliennummernplatzhalter 2"/>
+          <p:cNvSpPr>
+            <a:spLocks noGrp="1"/>
+          </p:cNvSpPr>
+          <p:nvPr>
+            <p:ph type="sldNum" sz="quarter" idx="11"/>
+          </p:nvPr>
+        </p:nvSpPr>
+        <p:spPr>
+          <a:xfrm>
+            <a:off x="6048138" y="6528870"/>
+            <a:ext cx="2988574" cy="329130"/>
+          </a:xfrm>
+        </p:spPr>
+        <p:txBody>
+          <a:bodyPr/>
+          <a:lstStyle/>
+          <a:p>
+            <a:r>
+              <a:rPr lang="en-GB" noProof="0" smtClean="0"/>
+              <a:t>Page </a:t>
+            </a:r>
+            <a:fld id="{AA807A42-CF27-4B84-8583-18EBE418342E}" type="slidenum">
+              <a:rPr lang="en-GB" noProof="0" smtClean="0"/>
+              <a:pPr/>
+              <a:t>39</a:t>
+            </a:fld>
+            <a:endParaRPr lang="en-GB" noProof="0" dirty="0"/>
+          </a:p>
+        </p:txBody>
+      </p:sp>
+      <p:sp>
+        <p:nvSpPr>
+          <p:cNvPr id="8" name="Textplatzhalter 3"/>
+          <p:cNvSpPr>
+            <a:spLocks noGrp="1"/>
+          </p:cNvSpPr>
+          <p:nvPr>
+            <p:ph type="body" sz="quarter" idx="13"/>
+          </p:nvPr>
+        </p:nvSpPr>
+        <p:spPr>
+          <a:xfrm>
+            <a:off x="465138" y="403226"/>
+            <a:ext cx="11263312" cy="960437"/>
+          </a:xfrm>
+        </p:spPr>
+        <p:txBody>
+          <a:bodyPr/>
+          <a:lstStyle/>
+          <a:p>
+            <a:r>
+              <a:rPr lang="en-GB" dirty="0" smtClean="0"/>
               <a:t>AUTOSAR methodology.</a:t>
             </a:r>
           </a:p>
@@ -30024,7 +30339,7 @@
   <p:timing>
     <p:tnLst>
       <p:par>
-        <p:cTn xmlns:p14="http://schemas.microsoft.com/office/powerpoint/2010/main" id="1" dur="indefinite" restart="never" nodeType="tmRoot">
+        <p:cTn id="1" dur="indefinite" restart="never" nodeType="tmRoot">
           <p:childTnLst>
             <p:seq concurrent="1" nextAc="seek">
               <p:cTn id="2" dur="indefinite" nodeType="mainSeq">
@@ -30287,7 +30602,7 @@
 </p:sld>
 </file>
 
-<file path=ppt/slides/slide39.xml><?xml version="1.0" encoding="utf-8"?>
+<file path=ppt/slides/slide4.xml><?xml version="1.0" encoding="utf-8"?>
 <p:sld xmlns:a="http://schemas.openxmlformats.org/drawingml/2006/main" xmlns:r="http://schemas.openxmlformats.org/officeDocument/2006/relationships" xmlns:p="http://schemas.openxmlformats.org/presentationml/2006/main">
   <p:cSld>
     <p:spTree>
@@ -30306,7 +30621,7 @@
       </p:grpSpPr>
       <p:sp>
         <p:nvSpPr>
-          <p:cNvPr id="6" name="Fußzeilenplatzhalter 1"/>
+          <p:cNvPr id="2" name="Fußzeilenplatzhalter 1"/>
           <p:cNvSpPr>
             <a:spLocks noGrp="1"/>
           </p:cNvSpPr>
@@ -30314,12 +30629,7 @@
             <p:ph type="ftr" sz="quarter" idx="10"/>
           </p:nvPr>
         </p:nvSpPr>
-        <p:spPr>
-          <a:xfrm>
-            <a:off x="465138" y="6508573"/>
-            <a:ext cx="4021247" cy="331787"/>
-          </a:xfrm>
-        </p:spPr>
+        <p:spPr/>
         <p:txBody>
           <a:bodyPr/>
           <a:lstStyle/>
@@ -30339,7 +30649,7 @@
       </p:sp>
       <p:sp>
         <p:nvSpPr>
-          <p:cNvPr id="7" name="Foliennummernplatzhalter 2"/>
+          <p:cNvPr id="3" name="Foliennummernplatzhalter 2"/>
           <p:cNvSpPr>
             <a:spLocks noGrp="1"/>
           </p:cNvSpPr>
@@ -30347,12 +30657,7 @@
             <p:ph type="sldNum" sz="quarter" idx="11"/>
           </p:nvPr>
         </p:nvSpPr>
-        <p:spPr>
-          <a:xfrm>
-            <a:off x="6048138" y="6528870"/>
-            <a:ext cx="2988574" cy="329130"/>
-          </a:xfrm>
-        </p:spPr>
+        <p:spPr/>
         <p:txBody>
           <a:bodyPr/>
           <a:lstStyle/>
@@ -30364,7 +30669,7 @@
             <a:fld id="{AA807A42-CF27-4B84-8583-18EBE418342E}" type="slidenum">
               <a:rPr lang="en-GB" noProof="0" smtClean="0"/>
               <a:pPr/>
-              <a:t>39</a:t>
+              <a:t>4</a:t>
             </a:fld>
             <a:endParaRPr lang="en-GB" noProof="0" dirty="0"/>
           </a:p>
@@ -30372,7 +30677,7 @@
       </p:sp>
       <p:sp>
         <p:nvSpPr>
-          <p:cNvPr id="8" name="Textplatzhalter 3"/>
+          <p:cNvPr id="6" name="Textplatzhalter 3"/>
           <p:cNvSpPr>
             <a:spLocks noGrp="1"/>
           </p:cNvSpPr>
@@ -30382,8 +30687,8 @@
         </p:nvSpPr>
         <p:spPr>
           <a:xfrm>
-            <a:off x="465138" y="403226"/>
-            <a:ext cx="11263312" cy="960437"/>
+            <a:off x="348763" y="403227"/>
+            <a:ext cx="8445285" cy="960437"/>
           </a:xfrm>
         </p:spPr>
         <p:txBody>
@@ -30392,29 +30697,20 @@
           <a:p>
             <a:r>
               <a:rPr lang="en-GB" dirty="0" smtClean="0"/>
-              <a:t>MPS.</a:t>
-            </a:r>
-          </a:p>
-          <a:p>
-            <a:r>
-              <a:rPr lang="en-GB" dirty="0" err="1" smtClean="0"/>
-              <a:t>Mbeddr</a:t>
-            </a:r>
+              <a:t>Context.</a:t>
+            </a:r>
+          </a:p>
+          <a:p>
             <a:r>
               <a:rPr lang="en-GB" dirty="0" smtClean="0"/>
-              <a:t> + </a:t>
-            </a:r>
-            <a:r>
-              <a:rPr lang="en-GB" dirty="0" err="1" smtClean="0"/>
-              <a:t>autosar</a:t>
-            </a:r>
-            <a:endParaRPr lang="en-GB" dirty="0" smtClean="0"/>
+              <a:t>What is mbeddr?</a:t>
+            </a:r>
           </a:p>
         </p:txBody>
       </p:sp>
       <p:sp>
         <p:nvSpPr>
-          <p:cNvPr id="9" name="Textplatzhalter 4"/>
+          <p:cNvPr id="7" name="Textplatzhalter 4"/>
           <p:cNvSpPr>
             <a:spLocks noGrp="1"/>
           </p:cNvSpPr>
@@ -30424,8 +30720,8 @@
         </p:nvSpPr>
         <p:spPr>
           <a:xfrm>
-            <a:off x="465138" y="1611038"/>
-            <a:ext cx="11263312" cy="4861700"/>
+            <a:off x="348763" y="1628679"/>
+            <a:ext cx="8445285" cy="4861700"/>
           </a:xfrm>
         </p:spPr>
         <p:txBody>
@@ -30467,14 +30763,14 @@
       </p:sp>
       <p:sp>
         <p:nvSpPr>
-          <p:cNvPr id="10" name="Rechteck 8"/>
+          <p:cNvPr id="9" name="Rechteck 8"/>
           <p:cNvSpPr/>
           <p:nvPr/>
         </p:nvSpPr>
         <p:spPr>
           <a:xfrm>
-            <a:off x="1832262" y="2458800"/>
-            <a:ext cx="7992888" cy="216024"/>
+            <a:off x="1373839" y="2476441"/>
+            <a:ext cx="5993105" cy="216024"/>
           </a:xfrm>
           <a:prstGeom prst="rect">
             <a:avLst/>
@@ -30506,7 +30802,7 @@
           <a:lstStyle/>
           <a:p>
             <a:pPr algn="ctr"/>
-            <a:endParaRPr lang="de-DE" sz="4000">
+            <a:endParaRPr lang="de-DE" sz="3200">
               <a:latin typeface="Calibri"/>
               <a:cs typeface="Calibri"/>
             </a:endParaRPr>
@@ -30515,7 +30811,7 @@
       </p:sp>
       <p:sp>
         <p:nvSpPr>
-          <p:cNvPr id="12" name="Textplatzhalter 3"/>
+          <p:cNvPr id="10" name="Titel 1"/>
           <p:cNvSpPr txBox="1">
             <a:spLocks/>
           </p:cNvSpPr>
@@ -30523,86 +30819,143 @@
         </p:nvSpPr>
         <p:spPr>
           <a:xfrm>
-            <a:off x="2865360" y="3378210"/>
-            <a:ext cx="7161268" cy="960437"/>
+            <a:off x="1319847" y="1324313"/>
+            <a:ext cx="8114861" cy="836712"/>
           </a:xfrm>
           <a:prstGeom prst="rect">
             <a:avLst/>
           </a:prstGeom>
         </p:spPr>
         <p:txBody>
-          <a:bodyPr lIns="0" tIns="0" rIns="0" bIns="0">
+          <a:bodyPr vert="horz" lIns="91440" tIns="45720" rIns="91440" bIns="45720" rtlCol="0" anchor="ctr">
             <a:noAutofit/>
           </a:bodyPr>
-          <a:lstStyle/>
-          <a:p>
-            <a:pPr marL="0" marR="0" lvl="0" indent="0" algn="l" defTabSz="914400" rtl="0" eaLnBrk="1" fontAlgn="auto" latinLnBrk="0" hangingPunct="1">
-              <a:lnSpc>
-                <a:spcPts val="2800"/>
-              </a:lnSpc>
+          <a:lstStyle>
+            <a:lvl1pPr algn="ctr" defTabSz="914400" rtl="0" eaLnBrk="1" latinLnBrk="0" hangingPunct="1">
               <a:spcBef>
-                <a:spcPts val="0"/>
+                <a:spcPct val="0"/>
               </a:spcBef>
-              <a:spcAft>
-                <a:spcPts val="0"/>
-              </a:spcAft>
-              <a:buClrTx/>
-              <a:buSzTx/>
-              <a:buFont typeface="Arial" pitchFamily="34" charset="0"/>
               <a:buNone/>
-              <a:tabLst/>
-              <a:defRPr/>
-            </a:pPr>
-            <a:r>
-              <a:rPr kumimoji="0" lang="en-GB" sz="8800" b="1" i="0" u="none" strike="noStrike" kern="1200" cap="all" spc="0" normalizeH="0" baseline="0" noProof="0" smtClean="0">
-                <a:ln>
-                  <a:noFill/>
-                </a:ln>
+              <a:defRPr sz="4400" kern="1200">
                 <a:solidFill>
-                  <a:schemeClr val="bg2"/>
+                  <a:schemeClr val="tx1"/>
                 </a:solidFill>
-                <a:effectLst/>
-                <a:uLnTx/>
-                <a:uFillTx/>
-                <a:latin typeface="+mn-lt"/>
-                <a:ea typeface="+mn-ea"/>
-                <a:cs typeface="+mn-cs"/>
+                <a:latin typeface="+mj-lt"/>
+                <a:ea typeface="+mj-ea"/>
+                <a:cs typeface="+mj-cs"/>
+              </a:defRPr>
+            </a:lvl1pPr>
+          </a:lstStyle>
+          <a:p>
+            <a:pPr algn="l"/>
+            <a:r>
+              <a:rPr lang="de-DE" sz="3200" b="1" dirty="0">
+                <a:solidFill>
+                  <a:schemeClr val="tx1">
+                    <a:lumMod val="75000"/>
+                    <a:lumOff val="25000"/>
+                  </a:schemeClr>
+                </a:solidFill>
+                <a:latin typeface="Calibri"/>
+                <a:ea typeface="Verdana" pitchFamily="34" charset="0"/>
+                <a:cs typeface="Calibri"/>
               </a:rPr>
-              <a:t>DEMO</a:t>
-            </a:r>
-            <a:endParaRPr kumimoji="0" lang="en-GB" sz="8800" b="1" i="0" u="none" strike="noStrike" kern="1200" cap="all" spc="0" normalizeH="0" baseline="0" noProof="0" dirty="0" smtClean="0">
-              <a:ln>
-                <a:noFill/>
-              </a:ln>
-              <a:solidFill>
-                <a:schemeClr val="bg2"/>
-              </a:solidFill>
-              <a:effectLst/>
-              <a:uLnTx/>
-              <a:uFillTx/>
-              <a:latin typeface="+mn-lt"/>
-              <a:ea typeface="+mn-ea"/>
-              <a:cs typeface="+mn-cs"/>
-            </a:endParaRPr>
+              <a:t>An extensible set of integrated </a:t>
+            </a:r>
+            <a:r>
+              <a:rPr lang="de-DE" sz="3200" b="1" dirty="0">
+                <a:solidFill>
+                  <a:srgbClr val="FF0000"/>
+                </a:solidFill>
+                <a:latin typeface="Calibri"/>
+                <a:ea typeface="Verdana" pitchFamily="34" charset="0"/>
+                <a:cs typeface="Calibri"/>
+              </a:rPr>
+              <a:t>languages </a:t>
+            </a:r>
           </a:p>
         </p:txBody>
       </p:sp>
+      <p:sp>
+        <p:nvSpPr>
+          <p:cNvPr id="11" name="Titel 1"/>
+          <p:cNvSpPr txBox="1">
+            <a:spLocks/>
+          </p:cNvSpPr>
+          <p:nvPr/>
+        </p:nvSpPr>
+        <p:spPr>
+          <a:xfrm>
+            <a:off x="1332419" y="1900377"/>
+            <a:ext cx="6559640" cy="836712"/>
+          </a:xfrm>
+          <a:prstGeom prst="rect">
+            <a:avLst/>
+          </a:prstGeom>
+        </p:spPr>
+        <p:txBody>
+          <a:bodyPr vert="horz" lIns="91440" tIns="45720" rIns="91440" bIns="45720" rtlCol="0" anchor="ctr">
+            <a:noAutofit/>
+          </a:bodyPr>
+          <a:lstStyle>
+            <a:lvl1pPr algn="ctr" defTabSz="914400" rtl="0" eaLnBrk="1" latinLnBrk="0" hangingPunct="1">
+              <a:spcBef>
+                <a:spcPct val="0"/>
+              </a:spcBef>
+              <a:buNone/>
+              <a:defRPr sz="4400" kern="1200">
+                <a:solidFill>
+                  <a:schemeClr val="tx1"/>
+                </a:solidFill>
+                <a:latin typeface="+mj-lt"/>
+                <a:ea typeface="+mj-ea"/>
+                <a:cs typeface="+mj-cs"/>
+              </a:defRPr>
+            </a:lvl1pPr>
+          </a:lstStyle>
+          <a:p>
+            <a:pPr algn="l"/>
+            <a:r>
+              <a:rPr lang="de-DE" sz="3200" b="1" dirty="0">
+                <a:solidFill>
+                  <a:schemeClr val="tx1">
+                    <a:lumMod val="75000"/>
+                    <a:lumOff val="25000"/>
+                  </a:schemeClr>
+                </a:solidFill>
+                <a:latin typeface="Calibri"/>
+                <a:ea typeface="Verdana" pitchFamily="34" charset="0"/>
+                <a:cs typeface="Calibri"/>
+              </a:rPr>
+              <a:t>for embedded software engineering. </a:t>
+            </a:r>
+          </a:p>
+        </p:txBody>
+      </p:sp>
     </p:spTree>
+    <p:extLst>
+      <p:ext uri="{BB962C8B-B14F-4D97-AF65-F5344CB8AC3E}">
+        <p14:creationId xmlns:p14="http://schemas.microsoft.com/office/powerpoint/2010/main" xmlns="" val="3938426385"/>
+      </p:ext>
+    </p:extLst>
   </p:cSld>
   <p:clrMapOvr>
     <a:masterClrMapping/>
   </p:clrMapOvr>
+  <p:transition>
+    <p:fade/>
+  </p:transition>
   <p:timing>
     <p:tnLst>
       <p:par>
-        <p:cTn xmlns:p14="http://schemas.microsoft.com/office/powerpoint/2010/main" id="1" dur="indefinite" restart="never" nodeType="tmRoot"/>
+        <p:cTn id="1" dur="indefinite" restart="never" nodeType="tmRoot"/>
       </p:par>
     </p:tnLst>
   </p:timing>
 </p:sld>
 </file>
 
-<file path=ppt/slides/slide4.xml><?xml version="1.0" encoding="utf-8"?>
+<file path=ppt/slides/slide40.xml><?xml version="1.0" encoding="utf-8"?>
 <p:sld xmlns:a="http://schemas.openxmlformats.org/drawingml/2006/main" xmlns:r="http://schemas.openxmlformats.org/officeDocument/2006/relationships" xmlns:p="http://schemas.openxmlformats.org/presentationml/2006/main">
   <p:cSld>
     <p:spTree>
@@ -30621,6 +30974,213 @@
       </p:grpSpPr>
       <p:sp>
         <p:nvSpPr>
+          <p:cNvPr id="6" name="Fußzeilenplatzhalter 1"/>
+          <p:cNvSpPr>
+            <a:spLocks noGrp="1"/>
+          </p:cNvSpPr>
+          <p:nvPr>
+            <p:ph type="ftr" sz="quarter" idx="10"/>
+          </p:nvPr>
+        </p:nvSpPr>
+        <p:spPr>
+          <a:xfrm>
+            <a:off x="465138" y="6508573"/>
+            <a:ext cx="4021247" cy="331787"/>
+          </a:xfrm>
+        </p:spPr>
+        <p:txBody>
+          <a:bodyPr/>
+          <a:lstStyle/>
+          <a:p>
+            <a:pPr algn="l"/>
+            <a:r>
+              <a:rPr lang="de-DE" dirty="0" err="1" smtClean="0"/>
+              <a:t>mbeddr</a:t>
+            </a:r>
+            <a:r>
+              <a:rPr lang="de-DE" dirty="0" smtClean="0"/>
+              <a:t>, 29.10.2013</a:t>
+            </a:r>
+            <a:endParaRPr lang="de-DE" dirty="0"/>
+          </a:p>
+        </p:txBody>
+      </p:sp>
+      <p:sp>
+        <p:nvSpPr>
+          <p:cNvPr id="7" name="Foliennummernplatzhalter 2"/>
+          <p:cNvSpPr>
+            <a:spLocks noGrp="1"/>
+          </p:cNvSpPr>
+          <p:nvPr>
+            <p:ph type="sldNum" sz="quarter" idx="11"/>
+          </p:nvPr>
+        </p:nvSpPr>
+        <p:spPr>
+          <a:xfrm>
+            <a:off x="6048138" y="6528870"/>
+            <a:ext cx="2988574" cy="329130"/>
+          </a:xfrm>
+        </p:spPr>
+        <p:txBody>
+          <a:bodyPr/>
+          <a:lstStyle/>
+          <a:p>
+            <a:r>
+              <a:rPr lang="en-GB" noProof="0" smtClean="0"/>
+              <a:t>Page </a:t>
+            </a:r>
+            <a:fld id="{AA807A42-CF27-4B84-8583-18EBE418342E}" type="slidenum">
+              <a:rPr lang="en-GB" noProof="0" smtClean="0"/>
+              <a:pPr/>
+              <a:t>40</a:t>
+            </a:fld>
+            <a:endParaRPr lang="en-GB" noProof="0" dirty="0"/>
+          </a:p>
+        </p:txBody>
+      </p:sp>
+      <p:sp>
+        <p:nvSpPr>
+          <p:cNvPr id="8" name="Textplatzhalter 3"/>
+          <p:cNvSpPr>
+            <a:spLocks noGrp="1"/>
+          </p:cNvSpPr>
+          <p:nvPr>
+            <p:ph type="body" sz="quarter" idx="13"/>
+          </p:nvPr>
+        </p:nvSpPr>
+        <p:spPr>
+          <a:xfrm>
+            <a:off x="465138" y="403226"/>
+            <a:ext cx="11263312" cy="960437"/>
+          </a:xfrm>
+        </p:spPr>
+        <p:txBody>
+          <a:bodyPr/>
+          <a:lstStyle/>
+          <a:p>
+            <a:r>
+              <a:rPr lang="en-GB" dirty="0" smtClean="0"/>
+              <a:t>Thank you!</a:t>
+            </a:r>
+          </a:p>
+        </p:txBody>
+      </p:sp>
+      <p:sp>
+        <p:nvSpPr>
+          <p:cNvPr id="9" name="Textplatzhalter 4"/>
+          <p:cNvSpPr>
+            <a:spLocks noGrp="1"/>
+          </p:cNvSpPr>
+          <p:nvPr>
+            <p:ph type="body" sz="quarter" idx="14"/>
+          </p:nvPr>
+        </p:nvSpPr>
+        <p:spPr>
+          <a:xfrm>
+            <a:off x="465138" y="1611038"/>
+            <a:ext cx="11263312" cy="4861700"/>
+          </a:xfrm>
+        </p:spPr>
+        <p:txBody>
+          <a:bodyPr/>
+          <a:lstStyle/>
+          <a:p>
+            <a:pPr marL="266700" indent="-266700">
+              <a:spcBef>
+                <a:spcPct val="0"/>
+              </a:spcBef>
+            </a:pPr>
+            <a:endParaRPr lang="en-US" dirty="0" smtClean="0">
+              <a:ea typeface="ＭＳ Ｐゴシック" charset="-128"/>
+            </a:endParaRPr>
+          </a:p>
+          <a:p>
+            <a:pPr marL="266700" indent="-266700">
+              <a:spcBef>
+                <a:spcPct val="0"/>
+              </a:spcBef>
+              <a:buFont typeface="Symbol" pitchFamily="18" charset="2"/>
+              <a:buChar char="-"/>
+            </a:pPr>
+            <a:endParaRPr lang="en-US" dirty="0">
+              <a:ea typeface="ＭＳ Ｐゴシック" charset="-128"/>
+            </a:endParaRPr>
+          </a:p>
+          <a:p>
+            <a:pPr>
+              <a:buFontTx/>
+              <a:buChar char="-"/>
+            </a:pPr>
+            <a:endParaRPr lang="en-US" dirty="0" smtClean="0"/>
+          </a:p>
+          <a:p>
+            <a:endParaRPr lang="de-DE" dirty="0"/>
+          </a:p>
+        </p:txBody>
+      </p:sp>
+      <p:pic>
+        <p:nvPicPr>
+          <p:cNvPr id="11" name="Bild 10" descr="1.pdf"/>
+          <p:cNvPicPr>
+            <a:picLocks noChangeAspect="1"/>
+          </p:cNvPicPr>
+          <p:nvPr/>
+        </p:nvPicPr>
+        <p:blipFill rotWithShape="1">
+          <a:blip r:embed="rId2" cstate="print">
+            <a:extLst>
+              <a:ext uri="{28A0092B-C50C-407E-A947-70E740481C1C}">
+                <a14:useLocalDpi xmlns:a14="http://schemas.microsoft.com/office/drawing/2010/main" xmlns="" val="0"/>
+              </a:ext>
+            </a:extLst>
+          </a:blip>
+          <a:srcRect l="9528" t="21373" r="10398" b="17256"/>
+          <a:stretch/>
+        </p:blipFill>
+        <p:spPr>
+          <a:xfrm>
+            <a:off x="1269836" y="2156259"/>
+            <a:ext cx="6155667" cy="2675371"/>
+          </a:xfrm>
+          <a:prstGeom prst="rect">
+            <a:avLst/>
+          </a:prstGeom>
+        </p:spPr>
+      </p:pic>
+    </p:spTree>
+  </p:cSld>
+  <p:clrMapOvr>
+    <a:masterClrMapping/>
+  </p:clrMapOvr>
+  <p:timing>
+    <p:tnLst>
+      <p:par>
+        <p:cTn id="1" dur="indefinite" restart="never" nodeType="tmRoot"/>
+      </p:par>
+    </p:tnLst>
+  </p:timing>
+</p:sld>
+</file>
+
+<file path=ppt/slides/slide5.xml><?xml version="1.0" encoding="utf-8"?>
+<p:sld xmlns:a="http://schemas.openxmlformats.org/drawingml/2006/main" xmlns:r="http://schemas.openxmlformats.org/officeDocument/2006/relationships" xmlns:p="http://schemas.openxmlformats.org/presentationml/2006/main">
+  <p:cSld>
+    <p:spTree>
+      <p:nvGrpSpPr>
+        <p:cNvPr id="1" name=""/>
+        <p:cNvGrpSpPr/>
+        <p:nvPr/>
+      </p:nvGrpSpPr>
+      <p:grpSpPr>
+        <a:xfrm>
+          <a:off x="0" y="0"/>
+          <a:ext cx="0" cy="0"/>
+          <a:chOff x="0" y="0"/>
+          <a:chExt cx="0" cy="0"/>
+        </a:xfrm>
+      </p:grpSpPr>
+      <p:sp>
+        <p:nvSpPr>
           <p:cNvPr id="2" name="Fußzeilenplatzhalter 1"/>
           <p:cNvSpPr>
             <a:spLocks noGrp="1"/>
@@ -30669,7 +31229,7 @@
             <a:fld id="{AA807A42-CF27-4B84-8583-18EBE418342E}" type="slidenum">
               <a:rPr lang="en-GB" noProof="0" smtClean="0"/>
               <a:pPr/>
-              <a:t>4</a:t>
+              <a:t>5</a:t>
             </a:fld>
             <a:endParaRPr lang="en-GB" noProof="0" dirty="0"/>
           </a:p>
@@ -30860,7 +31420,7 @@
                 <a:ea typeface="Verdana" pitchFamily="34" charset="0"/>
                 <a:cs typeface="Calibri"/>
               </a:rPr>
-              <a:t>An extensible set of integrated </a:t>
+              <a:t>An extensible set of </a:t>
             </a:r>
             <a:r>
               <a:rPr lang="de-DE" sz="3200" b="1" dirty="0">
@@ -30871,7 +31431,21 @@
                 <a:ea typeface="Verdana" pitchFamily="34" charset="0"/>
                 <a:cs typeface="Calibri"/>
               </a:rPr>
-              <a:t>languages </a:t>
+              <a:t>integrated</a:t>
+            </a:r>
+            <a:r>
+              <a:rPr lang="de-DE" sz="3200" b="1" dirty="0">
+                <a:solidFill>
+                  <a:schemeClr val="tx1">
+                    <a:lumMod val="75000"/>
+                    <a:lumOff val="25000"/>
+                  </a:schemeClr>
+                </a:solidFill>
+                <a:latin typeface="Calibri"/>
+                <a:ea typeface="Verdana" pitchFamily="34" charset="0"/>
+                <a:cs typeface="Calibri"/>
+              </a:rPr>
+              <a:t> languages </a:t>
             </a:r>
           </a:p>
         </p:txBody>
@@ -30935,27 +31509,27 @@
     </p:spTree>
     <p:extLst>
       <p:ext uri="{BB962C8B-B14F-4D97-AF65-F5344CB8AC3E}">
-        <p14:creationId xmlns:p14="http://schemas.microsoft.com/office/powerpoint/2010/main" val="3938426385"/>
+        <p14:creationId xmlns:p14="http://schemas.microsoft.com/office/powerpoint/2010/main" xmlns="" val="144512218"/>
       </p:ext>
     </p:extLst>
   </p:cSld>
   <p:clrMapOvr>
     <a:masterClrMapping/>
   </p:clrMapOvr>
-  <p:transition xmlns:p14="http://schemas.microsoft.com/office/powerpoint/2010/main">
+  <p:transition>
     <p:fade/>
   </p:transition>
   <p:timing>
     <p:tnLst>
       <p:par>
-        <p:cTn xmlns:p14="http://schemas.microsoft.com/office/powerpoint/2010/main" id="1" dur="indefinite" restart="never" nodeType="tmRoot"/>
+        <p:cTn id="1" dur="indefinite" restart="never" nodeType="tmRoot"/>
       </p:par>
     </p:tnLst>
   </p:timing>
 </p:sld>
 </file>
 
-<file path=ppt/slides/slide40.xml><?xml version="1.0" encoding="utf-8"?>
+<file path=ppt/slides/slide6.xml><?xml version="1.0" encoding="utf-8"?>
 <p:sld xmlns:a="http://schemas.openxmlformats.org/drawingml/2006/main" xmlns:r="http://schemas.openxmlformats.org/officeDocument/2006/relationships" xmlns:p="http://schemas.openxmlformats.org/presentationml/2006/main">
   <p:cSld>
     <p:spTree>
@@ -30974,213 +31548,6 @@
       </p:grpSpPr>
       <p:sp>
         <p:nvSpPr>
-          <p:cNvPr id="6" name="Fußzeilenplatzhalter 1"/>
-          <p:cNvSpPr>
-            <a:spLocks noGrp="1"/>
-          </p:cNvSpPr>
-          <p:nvPr>
-            <p:ph type="ftr" sz="quarter" idx="10"/>
-          </p:nvPr>
-        </p:nvSpPr>
-        <p:spPr>
-          <a:xfrm>
-            <a:off x="465138" y="6508573"/>
-            <a:ext cx="4021247" cy="331787"/>
-          </a:xfrm>
-        </p:spPr>
-        <p:txBody>
-          <a:bodyPr/>
-          <a:lstStyle/>
-          <a:p>
-            <a:pPr algn="l"/>
-            <a:r>
-              <a:rPr lang="de-DE" dirty="0" err="1" smtClean="0"/>
-              <a:t>mbeddr</a:t>
-            </a:r>
-            <a:r>
-              <a:rPr lang="de-DE" dirty="0" smtClean="0"/>
-              <a:t>, 29.10.2013</a:t>
-            </a:r>
-            <a:endParaRPr lang="de-DE" dirty="0"/>
-          </a:p>
-        </p:txBody>
-      </p:sp>
-      <p:sp>
-        <p:nvSpPr>
-          <p:cNvPr id="7" name="Foliennummernplatzhalter 2"/>
-          <p:cNvSpPr>
-            <a:spLocks noGrp="1"/>
-          </p:cNvSpPr>
-          <p:nvPr>
-            <p:ph type="sldNum" sz="quarter" idx="11"/>
-          </p:nvPr>
-        </p:nvSpPr>
-        <p:spPr>
-          <a:xfrm>
-            <a:off x="6048138" y="6528870"/>
-            <a:ext cx="2988574" cy="329130"/>
-          </a:xfrm>
-        </p:spPr>
-        <p:txBody>
-          <a:bodyPr/>
-          <a:lstStyle/>
-          <a:p>
-            <a:r>
-              <a:rPr lang="en-GB" noProof="0" smtClean="0"/>
-              <a:t>Page </a:t>
-            </a:r>
-            <a:fld id="{AA807A42-CF27-4B84-8583-18EBE418342E}" type="slidenum">
-              <a:rPr lang="en-GB" noProof="0" smtClean="0"/>
-              <a:pPr/>
-              <a:t>40</a:t>
-            </a:fld>
-            <a:endParaRPr lang="en-GB" noProof="0" dirty="0"/>
-          </a:p>
-        </p:txBody>
-      </p:sp>
-      <p:sp>
-        <p:nvSpPr>
-          <p:cNvPr id="8" name="Textplatzhalter 3"/>
-          <p:cNvSpPr>
-            <a:spLocks noGrp="1"/>
-          </p:cNvSpPr>
-          <p:nvPr>
-            <p:ph type="body" sz="quarter" idx="13"/>
-          </p:nvPr>
-        </p:nvSpPr>
-        <p:spPr>
-          <a:xfrm>
-            <a:off x="465138" y="403226"/>
-            <a:ext cx="11263312" cy="960437"/>
-          </a:xfrm>
-        </p:spPr>
-        <p:txBody>
-          <a:bodyPr/>
-          <a:lstStyle/>
-          <a:p>
-            <a:r>
-              <a:rPr lang="en-GB" dirty="0" smtClean="0"/>
-              <a:t>Thank you!</a:t>
-            </a:r>
-          </a:p>
-        </p:txBody>
-      </p:sp>
-      <p:sp>
-        <p:nvSpPr>
-          <p:cNvPr id="9" name="Textplatzhalter 4"/>
-          <p:cNvSpPr>
-            <a:spLocks noGrp="1"/>
-          </p:cNvSpPr>
-          <p:nvPr>
-            <p:ph type="body" sz="quarter" idx="14"/>
-          </p:nvPr>
-        </p:nvSpPr>
-        <p:spPr>
-          <a:xfrm>
-            <a:off x="465138" y="1611038"/>
-            <a:ext cx="11263312" cy="4861700"/>
-          </a:xfrm>
-        </p:spPr>
-        <p:txBody>
-          <a:bodyPr/>
-          <a:lstStyle/>
-          <a:p>
-            <a:pPr marL="266700" indent="-266700">
-              <a:spcBef>
-                <a:spcPct val="0"/>
-              </a:spcBef>
-            </a:pPr>
-            <a:endParaRPr lang="en-US" dirty="0" smtClean="0">
-              <a:ea typeface="ＭＳ Ｐゴシック" charset="-128"/>
-            </a:endParaRPr>
-          </a:p>
-          <a:p>
-            <a:pPr marL="266700" indent="-266700">
-              <a:spcBef>
-                <a:spcPct val="0"/>
-              </a:spcBef>
-              <a:buFont typeface="Symbol" pitchFamily="18" charset="2"/>
-              <a:buChar char="-"/>
-            </a:pPr>
-            <a:endParaRPr lang="en-US" dirty="0">
-              <a:ea typeface="ＭＳ Ｐゴシック" charset="-128"/>
-            </a:endParaRPr>
-          </a:p>
-          <a:p>
-            <a:pPr>
-              <a:buFontTx/>
-              <a:buChar char="-"/>
-            </a:pPr>
-            <a:endParaRPr lang="en-US" dirty="0" smtClean="0"/>
-          </a:p>
-          <a:p>
-            <a:endParaRPr lang="de-DE" dirty="0"/>
-          </a:p>
-        </p:txBody>
-      </p:sp>
-      <p:pic>
-        <p:nvPicPr>
-          <p:cNvPr id="11" name="Bild 10" descr="1.pdf"/>
-          <p:cNvPicPr>
-            <a:picLocks noChangeAspect="1"/>
-          </p:cNvPicPr>
-          <p:nvPr/>
-        </p:nvPicPr>
-        <p:blipFill rotWithShape="1">
-          <a:blip r:embed="rId2">
-            <a:extLst>
-              <a:ext uri="{28A0092B-C50C-407E-A947-70E740481C1C}">
-                <a14:useLocalDpi xmlns:a14="http://schemas.microsoft.com/office/drawing/2010/main" val="0"/>
-              </a:ext>
-            </a:extLst>
-          </a:blip>
-          <a:srcRect l="9528" t="21373" r="10398" b="17256"/>
-          <a:stretch/>
-        </p:blipFill>
-        <p:spPr>
-          <a:xfrm>
-            <a:off x="1269836" y="2156259"/>
-            <a:ext cx="6155667" cy="2675371"/>
-          </a:xfrm>
-          <a:prstGeom prst="rect">
-            <a:avLst/>
-          </a:prstGeom>
-        </p:spPr>
-      </p:pic>
-    </p:spTree>
-  </p:cSld>
-  <p:clrMapOvr>
-    <a:masterClrMapping/>
-  </p:clrMapOvr>
-  <p:timing>
-    <p:tnLst>
-      <p:par>
-        <p:cTn xmlns:p14="http://schemas.microsoft.com/office/powerpoint/2010/main" id="1" dur="indefinite" restart="never" nodeType="tmRoot"/>
-      </p:par>
-    </p:tnLst>
-  </p:timing>
-</p:sld>
-</file>
-
-<file path=ppt/slides/slide5.xml><?xml version="1.0" encoding="utf-8"?>
-<p:sld xmlns:a="http://schemas.openxmlformats.org/drawingml/2006/main" xmlns:r="http://schemas.openxmlformats.org/officeDocument/2006/relationships" xmlns:p="http://schemas.openxmlformats.org/presentationml/2006/main">
-  <p:cSld>
-    <p:spTree>
-      <p:nvGrpSpPr>
-        <p:cNvPr id="1" name=""/>
-        <p:cNvGrpSpPr/>
-        <p:nvPr/>
-      </p:nvGrpSpPr>
-      <p:grpSpPr>
-        <a:xfrm>
-          <a:off x="0" y="0"/>
-          <a:ext cx="0" cy="0"/>
-          <a:chOff x="0" y="0"/>
-          <a:chExt cx="0" cy="0"/>
-        </a:xfrm>
-      </p:grpSpPr>
-      <p:sp>
-        <p:nvSpPr>
           <p:cNvPr id="2" name="Fußzeilenplatzhalter 1"/>
           <p:cNvSpPr>
             <a:spLocks noGrp="1"/>
@@ -31229,7 +31596,7 @@
             <a:fld id="{AA807A42-CF27-4B84-8583-18EBE418342E}" type="slidenum">
               <a:rPr lang="en-GB" noProof="0" smtClean="0"/>
               <a:pPr/>
-              <a:t>5</a:t>
+              <a:t>6</a:t>
             </a:fld>
             <a:endParaRPr lang="en-GB" noProof="0" dirty="0"/>
           </a:p>
@@ -31420,7 +31787,7 @@
                 <a:ea typeface="Verdana" pitchFamily="34" charset="0"/>
                 <a:cs typeface="Calibri"/>
               </a:rPr>
-              <a:t>An extensible set of </a:t>
+              <a:t>An </a:t>
             </a:r>
             <a:r>
               <a:rPr lang="de-DE" sz="3200" b="1" dirty="0">
@@ -31431,7 +31798,7 @@
                 <a:ea typeface="Verdana" pitchFamily="34" charset="0"/>
                 <a:cs typeface="Calibri"/>
               </a:rPr>
-              <a:t>integrated</a:t>
+              <a:t>extensible</a:t>
             </a:r>
             <a:r>
               <a:rPr lang="de-DE" sz="3200" b="1" dirty="0">
@@ -31445,7 +31812,7 @@
                 <a:ea typeface="Verdana" pitchFamily="34" charset="0"/>
                 <a:cs typeface="Calibri"/>
               </a:rPr>
-              <a:t> languages </a:t>
+              <a:t> set of integrated languages </a:t>
             </a:r>
           </a:p>
         </p:txBody>
@@ -31509,27 +31876,27 @@
     </p:spTree>
     <p:extLst>
       <p:ext uri="{BB962C8B-B14F-4D97-AF65-F5344CB8AC3E}">
-        <p14:creationId xmlns:p14="http://schemas.microsoft.com/office/powerpoint/2010/main" val="144512218"/>
+        <p14:creationId xmlns:p14="http://schemas.microsoft.com/office/powerpoint/2010/main" xmlns="" val="2888238089"/>
       </p:ext>
     </p:extLst>
   </p:cSld>
   <p:clrMapOvr>
     <a:masterClrMapping/>
   </p:clrMapOvr>
-  <p:transition xmlns:p14="http://schemas.microsoft.com/office/powerpoint/2010/main">
+  <p:transition>
     <p:fade/>
   </p:transition>
   <p:timing>
     <p:tnLst>
       <p:par>
-        <p:cTn xmlns:p14="http://schemas.microsoft.com/office/powerpoint/2010/main" id="1" dur="indefinite" restart="never" nodeType="tmRoot"/>
+        <p:cTn id="1" dur="indefinite" restart="never" nodeType="tmRoot"/>
       </p:par>
     </p:tnLst>
   </p:timing>
 </p:sld>
 </file>
 
-<file path=ppt/slides/slide6.xml><?xml version="1.0" encoding="utf-8"?>
+<file path=ppt/slides/slide7.xml><?xml version="1.0" encoding="utf-8"?>
 <p:sld xmlns:a="http://schemas.openxmlformats.org/drawingml/2006/main" xmlns:r="http://schemas.openxmlformats.org/officeDocument/2006/relationships" xmlns:p="http://schemas.openxmlformats.org/presentationml/2006/main">
   <p:cSld>
     <p:spTree>
@@ -31596,7 +31963,7 @@
             <a:fld id="{AA807A42-CF27-4B84-8583-18EBE418342E}" type="slidenum">
               <a:rPr lang="en-GB" noProof="0" smtClean="0"/>
               <a:pPr/>
-              <a:t>6</a:t>
+              <a:t>7</a:t>
             </a:fld>
             <a:endParaRPr lang="en-GB" noProof="0" dirty="0"/>
           </a:p>
@@ -31787,32 +32154,7 @@
                 <a:ea typeface="Verdana" pitchFamily="34" charset="0"/>
                 <a:cs typeface="Calibri"/>
               </a:rPr>
-              <a:t>An </a:t>
-            </a:r>
-            <a:r>
-              <a:rPr lang="de-DE" sz="3200" b="1" dirty="0">
-                <a:solidFill>
-                  <a:srgbClr val="FF0000"/>
-                </a:solidFill>
-                <a:latin typeface="Calibri"/>
-                <a:ea typeface="Verdana" pitchFamily="34" charset="0"/>
-                <a:cs typeface="Calibri"/>
-              </a:rPr>
-              <a:t>extensible</a:t>
-            </a:r>
-            <a:r>
-              <a:rPr lang="de-DE" sz="3200" b="1" dirty="0">
-                <a:solidFill>
-                  <a:schemeClr val="tx1">
-                    <a:lumMod val="75000"/>
-                    <a:lumOff val="25000"/>
-                  </a:schemeClr>
-                </a:solidFill>
-                <a:latin typeface="Calibri"/>
-                <a:ea typeface="Verdana" pitchFamily="34" charset="0"/>
-                <a:cs typeface="Calibri"/>
-              </a:rPr>
-              <a:t> set of integrated languages </a:t>
+              <a:t>An extensible set of integrated languages </a:t>
             </a:r>
           </a:p>
         </p:txBody>
@@ -31868,7 +32210,32 @@
                 <a:ea typeface="Verdana" pitchFamily="34" charset="0"/>
                 <a:cs typeface="Calibri"/>
               </a:rPr>
-              <a:t>for embedded software engineering. </a:t>
+              <a:t>for </a:t>
+            </a:r>
+            <a:r>
+              <a:rPr lang="de-DE" sz="3200" b="1" dirty="0">
+                <a:solidFill>
+                  <a:srgbClr val="FF0000"/>
+                </a:solidFill>
+                <a:latin typeface="Calibri"/>
+                <a:ea typeface="Verdana" pitchFamily="34" charset="0"/>
+                <a:cs typeface="Calibri"/>
+              </a:rPr>
+              <a:t>embedded software</a:t>
+            </a:r>
+            <a:r>
+              <a:rPr lang="de-DE" sz="3200" b="1" dirty="0">
+                <a:solidFill>
+                  <a:schemeClr val="tx1">
+                    <a:lumMod val="75000"/>
+                    <a:lumOff val="25000"/>
+                  </a:schemeClr>
+                </a:solidFill>
+                <a:latin typeface="Calibri"/>
+                <a:ea typeface="Verdana" pitchFamily="34" charset="0"/>
+                <a:cs typeface="Calibri"/>
+              </a:rPr>
+              <a:t> engineering. </a:t>
             </a:r>
           </a:p>
         </p:txBody>
@@ -31876,27 +32243,27 @@
     </p:spTree>
     <p:extLst>
       <p:ext uri="{BB962C8B-B14F-4D97-AF65-F5344CB8AC3E}">
-        <p14:creationId xmlns:p14="http://schemas.microsoft.com/office/powerpoint/2010/main" val="2888238089"/>
+        <p14:creationId xmlns:p14="http://schemas.microsoft.com/office/powerpoint/2010/main" xmlns="" val="953527749"/>
       </p:ext>
     </p:extLst>
   </p:cSld>
   <p:clrMapOvr>
     <a:masterClrMapping/>
   </p:clrMapOvr>
-  <p:transition xmlns:p14="http://schemas.microsoft.com/office/powerpoint/2010/main">
+  <p:transition>
     <p:fade/>
   </p:transition>
   <p:timing>
     <p:tnLst>
       <p:par>
-        <p:cTn xmlns:p14="http://schemas.microsoft.com/office/powerpoint/2010/main" id="1" dur="indefinite" restart="never" nodeType="tmRoot"/>
+        <p:cTn id="1" dur="indefinite" restart="never" nodeType="tmRoot"/>
       </p:par>
     </p:tnLst>
   </p:timing>
 </p:sld>
 </file>
 
-<file path=ppt/slides/slide7.xml><?xml version="1.0" encoding="utf-8"?>
+<file path=ppt/slides/slide8.xml><?xml version="1.0" encoding="utf-8"?>
 <p:sld xmlns:a="http://schemas.openxmlformats.org/drawingml/2006/main" xmlns:r="http://schemas.openxmlformats.org/officeDocument/2006/relationships" xmlns:p="http://schemas.openxmlformats.org/presentationml/2006/main">
   <p:cSld>
     <p:spTree>
@@ -31963,7 +32330,7 @@
             <a:fld id="{AA807A42-CF27-4B84-8583-18EBE418342E}" type="slidenum">
               <a:rPr lang="en-GB" noProof="0" smtClean="0"/>
               <a:pPr/>
-              <a:t>7</a:t>
+              <a:t>8</a:t>
             </a:fld>
             <a:endParaRPr lang="en-GB" noProof="0" dirty="0"/>
           </a:p>
@@ -32210,7 +32577,7 @@
                 <a:ea typeface="Verdana" pitchFamily="34" charset="0"/>
                 <a:cs typeface="Calibri"/>
               </a:rPr>
-              <a:t>for </a:t>
+              <a:t>for embedded software </a:t>
             </a:r>
             <a:r>
               <a:rPr lang="de-DE" sz="3200" b="1" dirty="0">
@@ -32221,7 +32588,7 @@
                 <a:ea typeface="Verdana" pitchFamily="34" charset="0"/>
                 <a:cs typeface="Calibri"/>
               </a:rPr>
-              <a:t>embedded software</a:t>
+              <a:t>engineering</a:t>
             </a:r>
             <a:r>
               <a:rPr lang="de-DE" sz="3200" b="1" dirty="0">
@@ -32235,7 +32602,7 @@
                 <a:ea typeface="Verdana" pitchFamily="34" charset="0"/>
                 <a:cs typeface="Calibri"/>
               </a:rPr>
-              <a:t> engineering. </a:t>
+              <a:t>. </a:t>
             </a:r>
           </a:p>
         </p:txBody>
@@ -32243,27 +32610,27 @@
     </p:spTree>
     <p:extLst>
       <p:ext uri="{BB962C8B-B14F-4D97-AF65-F5344CB8AC3E}">
-        <p14:creationId xmlns:p14="http://schemas.microsoft.com/office/powerpoint/2010/main" val="953527749"/>
+        <p14:creationId xmlns:p14="http://schemas.microsoft.com/office/powerpoint/2010/main" xmlns="" val="4146777580"/>
       </p:ext>
     </p:extLst>
   </p:cSld>
   <p:clrMapOvr>
     <a:masterClrMapping/>
   </p:clrMapOvr>
-  <p:transition xmlns:p14="http://schemas.microsoft.com/office/powerpoint/2010/main">
+  <p:transition>
     <p:fade/>
   </p:transition>
   <p:timing>
     <p:tnLst>
       <p:par>
-        <p:cTn xmlns:p14="http://schemas.microsoft.com/office/powerpoint/2010/main" id="1" dur="indefinite" restart="never" nodeType="tmRoot"/>
+        <p:cTn id="1" dur="indefinite" restart="never" nodeType="tmRoot"/>
       </p:par>
     </p:tnLst>
   </p:timing>
 </p:sld>
 </file>
 
-<file path=ppt/slides/slide8.xml><?xml version="1.0" encoding="utf-8"?>
+<file path=ppt/slides/slide9.xml><?xml version="1.0" encoding="utf-8"?>
 <p:sld xmlns:a="http://schemas.openxmlformats.org/drawingml/2006/main" xmlns:r="http://schemas.openxmlformats.org/officeDocument/2006/relationships" xmlns:p="http://schemas.openxmlformats.org/presentationml/2006/main">
   <p:cSld>
     <p:spTree>
@@ -32330,7 +32697,7 @@
             <a:fld id="{AA807A42-CF27-4B84-8583-18EBE418342E}" type="slidenum">
               <a:rPr lang="en-GB" noProof="0" smtClean="0"/>
               <a:pPr/>
-              <a:t>8</a:t>
+              <a:t>9</a:t>
             </a:fld>
             <a:endParaRPr lang="en-GB" noProof="0" dirty="0"/>
           </a:p>
@@ -32577,373 +32944,6 @@
                 <a:ea typeface="Verdana" pitchFamily="34" charset="0"/>
                 <a:cs typeface="Calibri"/>
               </a:rPr>
-              <a:t>for embedded software </a:t>
-            </a:r>
-            <a:r>
-              <a:rPr lang="de-DE" sz="3200" b="1" dirty="0">
-                <a:solidFill>
-                  <a:srgbClr val="FF0000"/>
-                </a:solidFill>
-                <a:latin typeface="Calibri"/>
-                <a:ea typeface="Verdana" pitchFamily="34" charset="0"/>
-                <a:cs typeface="Calibri"/>
-              </a:rPr>
-              <a:t>engineering</a:t>
-            </a:r>
-            <a:r>
-              <a:rPr lang="de-DE" sz="3200" b="1" dirty="0">
-                <a:solidFill>
-                  <a:schemeClr val="tx1">
-                    <a:lumMod val="75000"/>
-                    <a:lumOff val="25000"/>
-                  </a:schemeClr>
-                </a:solidFill>
-                <a:latin typeface="Calibri"/>
-                <a:ea typeface="Verdana" pitchFamily="34" charset="0"/>
-                <a:cs typeface="Calibri"/>
-              </a:rPr>
-              <a:t>. </a:t>
-            </a:r>
-          </a:p>
-        </p:txBody>
-      </p:sp>
-    </p:spTree>
-    <p:extLst>
-      <p:ext uri="{BB962C8B-B14F-4D97-AF65-F5344CB8AC3E}">
-        <p14:creationId xmlns:p14="http://schemas.microsoft.com/office/powerpoint/2010/main" val="4146777580"/>
-      </p:ext>
-    </p:extLst>
-  </p:cSld>
-  <p:clrMapOvr>
-    <a:masterClrMapping/>
-  </p:clrMapOvr>
-  <p:transition xmlns:p14="http://schemas.microsoft.com/office/powerpoint/2010/main">
-    <p:fade/>
-  </p:transition>
-  <p:timing>
-    <p:tnLst>
-      <p:par>
-        <p:cTn xmlns:p14="http://schemas.microsoft.com/office/powerpoint/2010/main" id="1" dur="indefinite" restart="never" nodeType="tmRoot"/>
-      </p:par>
-    </p:tnLst>
-  </p:timing>
-</p:sld>
-</file>
-
-<file path=ppt/slides/slide9.xml><?xml version="1.0" encoding="utf-8"?>
-<p:sld xmlns:a="http://schemas.openxmlformats.org/drawingml/2006/main" xmlns:r="http://schemas.openxmlformats.org/officeDocument/2006/relationships" xmlns:p="http://schemas.openxmlformats.org/presentationml/2006/main">
-  <p:cSld>
-    <p:spTree>
-      <p:nvGrpSpPr>
-        <p:cNvPr id="1" name=""/>
-        <p:cNvGrpSpPr/>
-        <p:nvPr/>
-      </p:nvGrpSpPr>
-      <p:grpSpPr>
-        <a:xfrm>
-          <a:off x="0" y="0"/>
-          <a:ext cx="0" cy="0"/>
-          <a:chOff x="0" y="0"/>
-          <a:chExt cx="0" cy="0"/>
-        </a:xfrm>
-      </p:grpSpPr>
-      <p:sp>
-        <p:nvSpPr>
-          <p:cNvPr id="2" name="Fußzeilenplatzhalter 1"/>
-          <p:cNvSpPr>
-            <a:spLocks noGrp="1"/>
-          </p:cNvSpPr>
-          <p:nvPr>
-            <p:ph type="ftr" sz="quarter" idx="10"/>
-          </p:nvPr>
-        </p:nvSpPr>
-        <p:spPr/>
-        <p:txBody>
-          <a:bodyPr/>
-          <a:lstStyle/>
-          <a:p>
-            <a:pPr algn="l"/>
-            <a:r>
-              <a:rPr lang="de-DE" dirty="0" err="1" smtClean="0"/>
-              <a:t>mbeddr</a:t>
-            </a:r>
-            <a:r>
-              <a:rPr lang="de-DE" dirty="0" smtClean="0"/>
-              <a:t>, 29.10.2013</a:t>
-            </a:r>
-            <a:endParaRPr lang="de-DE" dirty="0"/>
-          </a:p>
-        </p:txBody>
-      </p:sp>
-      <p:sp>
-        <p:nvSpPr>
-          <p:cNvPr id="3" name="Foliennummernplatzhalter 2"/>
-          <p:cNvSpPr>
-            <a:spLocks noGrp="1"/>
-          </p:cNvSpPr>
-          <p:nvPr>
-            <p:ph type="sldNum" sz="quarter" idx="11"/>
-          </p:nvPr>
-        </p:nvSpPr>
-        <p:spPr/>
-        <p:txBody>
-          <a:bodyPr/>
-          <a:lstStyle/>
-          <a:p>
-            <a:r>
-              <a:rPr lang="en-GB" noProof="0" smtClean="0"/>
-              <a:t>Page </a:t>
-            </a:r>
-            <a:fld id="{AA807A42-CF27-4B84-8583-18EBE418342E}" type="slidenum">
-              <a:rPr lang="en-GB" noProof="0" smtClean="0"/>
-              <a:pPr/>
-              <a:t>9</a:t>
-            </a:fld>
-            <a:endParaRPr lang="en-GB" noProof="0" dirty="0"/>
-          </a:p>
-        </p:txBody>
-      </p:sp>
-      <p:sp>
-        <p:nvSpPr>
-          <p:cNvPr id="6" name="Textplatzhalter 3"/>
-          <p:cNvSpPr>
-            <a:spLocks noGrp="1"/>
-          </p:cNvSpPr>
-          <p:nvPr>
-            <p:ph type="body" sz="quarter" idx="13"/>
-          </p:nvPr>
-        </p:nvSpPr>
-        <p:spPr>
-          <a:xfrm>
-            <a:off x="348763" y="403227"/>
-            <a:ext cx="8445285" cy="960437"/>
-          </a:xfrm>
-        </p:spPr>
-        <p:txBody>
-          <a:bodyPr/>
-          <a:lstStyle/>
-          <a:p>
-            <a:r>
-              <a:rPr lang="en-GB" dirty="0" smtClean="0"/>
-              <a:t>Context.</a:t>
-            </a:r>
-          </a:p>
-          <a:p>
-            <a:r>
-              <a:rPr lang="en-GB" dirty="0" smtClean="0"/>
-              <a:t>What is mbeddr?</a:t>
-            </a:r>
-          </a:p>
-        </p:txBody>
-      </p:sp>
-      <p:sp>
-        <p:nvSpPr>
-          <p:cNvPr id="7" name="Textplatzhalter 4"/>
-          <p:cNvSpPr>
-            <a:spLocks noGrp="1"/>
-          </p:cNvSpPr>
-          <p:nvPr>
-            <p:ph type="body" sz="quarter" idx="14"/>
-          </p:nvPr>
-        </p:nvSpPr>
-        <p:spPr>
-          <a:xfrm>
-            <a:off x="348763" y="1628679"/>
-            <a:ext cx="8445285" cy="4861700"/>
-          </a:xfrm>
-        </p:spPr>
-        <p:txBody>
-          <a:bodyPr/>
-          <a:lstStyle/>
-          <a:p>
-            <a:pPr marL="266700" indent="-266700">
-              <a:spcBef>
-                <a:spcPct val="0"/>
-              </a:spcBef>
-            </a:pPr>
-            <a:endParaRPr lang="en-US" dirty="0" smtClean="0">
-              <a:ea typeface="ＭＳ Ｐゴシック" charset="-128"/>
-            </a:endParaRPr>
-          </a:p>
-          <a:p>
-            <a:pPr marL="266700" indent="-266700">
-              <a:spcBef>
-                <a:spcPct val="0"/>
-              </a:spcBef>
-              <a:buFont typeface="Symbol" pitchFamily="18" charset="2"/>
-              <a:buChar char="-"/>
-            </a:pPr>
-            <a:endParaRPr lang="en-US" dirty="0">
-              <a:ea typeface="ＭＳ Ｐゴシック" charset="-128"/>
-            </a:endParaRPr>
-          </a:p>
-          <a:p>
-            <a:pPr>
-              <a:buFontTx/>
-              <a:buChar char="-"/>
-            </a:pPr>
-            <a:endParaRPr lang="en-US" dirty="0" smtClean="0"/>
-          </a:p>
-          <a:p>
-            <a:endParaRPr lang="de-DE" dirty="0"/>
-          </a:p>
-        </p:txBody>
-      </p:sp>
-      <p:sp>
-        <p:nvSpPr>
-          <p:cNvPr id="9" name="Rechteck 8"/>
-          <p:cNvSpPr/>
-          <p:nvPr/>
-        </p:nvSpPr>
-        <p:spPr>
-          <a:xfrm>
-            <a:off x="1373839" y="2476441"/>
-            <a:ext cx="5993105" cy="216024"/>
-          </a:xfrm>
-          <a:prstGeom prst="rect">
-            <a:avLst/>
-          </a:prstGeom>
-          <a:solidFill>
-            <a:schemeClr val="bg1"/>
-          </a:solidFill>
-          <a:ln>
-            <a:noFill/>
-          </a:ln>
-          <a:effectLst/>
-        </p:spPr>
-        <p:style>
-          <a:lnRef idx="1">
-            <a:schemeClr val="accent1"/>
-          </a:lnRef>
-          <a:fillRef idx="3">
-            <a:schemeClr val="accent1"/>
-          </a:fillRef>
-          <a:effectRef idx="2">
-            <a:schemeClr val="accent1"/>
-          </a:effectRef>
-          <a:fontRef idx="minor">
-            <a:schemeClr val="lt1"/>
-          </a:fontRef>
-        </p:style>
-        <p:txBody>
-          <a:bodyPr rtlCol="0" anchor="ctr"/>
-          <a:lstStyle/>
-          <a:p>
-            <a:pPr algn="ctr"/>
-            <a:endParaRPr lang="de-DE" sz="3200">
-              <a:latin typeface="Calibri"/>
-              <a:cs typeface="Calibri"/>
-            </a:endParaRPr>
-          </a:p>
-        </p:txBody>
-      </p:sp>
-      <p:sp>
-        <p:nvSpPr>
-          <p:cNvPr id="10" name="Titel 1"/>
-          <p:cNvSpPr txBox="1">
-            <a:spLocks/>
-          </p:cNvSpPr>
-          <p:nvPr/>
-        </p:nvSpPr>
-        <p:spPr>
-          <a:xfrm>
-            <a:off x="1319847" y="1324313"/>
-            <a:ext cx="8114861" cy="836712"/>
-          </a:xfrm>
-          <a:prstGeom prst="rect">
-            <a:avLst/>
-          </a:prstGeom>
-        </p:spPr>
-        <p:txBody>
-          <a:bodyPr vert="horz" lIns="91440" tIns="45720" rIns="91440" bIns="45720" rtlCol="0" anchor="ctr">
-            <a:noAutofit/>
-          </a:bodyPr>
-          <a:lstStyle>
-            <a:lvl1pPr algn="ctr" defTabSz="914400" rtl="0" eaLnBrk="1" latinLnBrk="0" hangingPunct="1">
-              <a:spcBef>
-                <a:spcPct val="0"/>
-              </a:spcBef>
-              <a:buNone/>
-              <a:defRPr sz="4400" kern="1200">
-                <a:solidFill>
-                  <a:schemeClr val="tx1"/>
-                </a:solidFill>
-                <a:latin typeface="+mj-lt"/>
-                <a:ea typeface="+mj-ea"/>
-                <a:cs typeface="+mj-cs"/>
-              </a:defRPr>
-            </a:lvl1pPr>
-          </a:lstStyle>
-          <a:p>
-            <a:pPr algn="l"/>
-            <a:r>
-              <a:rPr lang="de-DE" sz="3200" b="1" dirty="0">
-                <a:solidFill>
-                  <a:schemeClr val="tx1">
-                    <a:lumMod val="75000"/>
-                    <a:lumOff val="25000"/>
-                  </a:schemeClr>
-                </a:solidFill>
-                <a:latin typeface="Calibri"/>
-                <a:ea typeface="Verdana" pitchFamily="34" charset="0"/>
-                <a:cs typeface="Calibri"/>
-              </a:rPr>
-              <a:t>An extensible set of integrated languages </a:t>
-            </a:r>
-          </a:p>
-        </p:txBody>
-      </p:sp>
-      <p:sp>
-        <p:nvSpPr>
-          <p:cNvPr id="11" name="Titel 1"/>
-          <p:cNvSpPr txBox="1">
-            <a:spLocks/>
-          </p:cNvSpPr>
-          <p:nvPr/>
-        </p:nvSpPr>
-        <p:spPr>
-          <a:xfrm>
-            <a:off x="1332419" y="1900377"/>
-            <a:ext cx="6559640" cy="836712"/>
-          </a:xfrm>
-          <a:prstGeom prst="rect">
-            <a:avLst/>
-          </a:prstGeom>
-        </p:spPr>
-        <p:txBody>
-          <a:bodyPr vert="horz" lIns="91440" tIns="45720" rIns="91440" bIns="45720" rtlCol="0" anchor="ctr">
-            <a:noAutofit/>
-          </a:bodyPr>
-          <a:lstStyle>
-            <a:lvl1pPr algn="ctr" defTabSz="914400" rtl="0" eaLnBrk="1" latinLnBrk="0" hangingPunct="1">
-              <a:spcBef>
-                <a:spcPct val="0"/>
-              </a:spcBef>
-              <a:buNone/>
-              <a:defRPr sz="4400" kern="1200">
-                <a:solidFill>
-                  <a:schemeClr val="tx1"/>
-                </a:solidFill>
-                <a:latin typeface="+mj-lt"/>
-                <a:ea typeface="+mj-ea"/>
-                <a:cs typeface="+mj-cs"/>
-              </a:defRPr>
-            </a:lvl1pPr>
-          </a:lstStyle>
-          <a:p>
-            <a:pPr algn="l"/>
-            <a:r>
-              <a:rPr lang="de-DE" sz="3200" b="1" dirty="0">
-                <a:solidFill>
-                  <a:schemeClr val="tx1">
-                    <a:lumMod val="75000"/>
-                    <a:lumOff val="25000"/>
-                  </a:schemeClr>
-                </a:solidFill>
-                <a:latin typeface="Calibri"/>
-                <a:ea typeface="Verdana" pitchFamily="34" charset="0"/>
-                <a:cs typeface="Calibri"/>
-              </a:rPr>
               <a:t>for embedded software engineering. </a:t>
             </a:r>
           </a:p>
@@ -32976,20 +32976,20 @@
     </p:spTree>
     <p:extLst>
       <p:ext uri="{BB962C8B-B14F-4D97-AF65-F5344CB8AC3E}">
-        <p14:creationId xmlns:p14="http://schemas.microsoft.com/office/powerpoint/2010/main" val="3326573663"/>
+        <p14:creationId xmlns:p14="http://schemas.microsoft.com/office/powerpoint/2010/main" xmlns="" val="3326573663"/>
       </p:ext>
     </p:extLst>
   </p:cSld>
   <p:clrMapOvr>
     <a:masterClrMapping/>
   </p:clrMapOvr>
-  <p:transition xmlns:p14="http://schemas.microsoft.com/office/powerpoint/2010/main">
+  <p:transition>
     <p:fade/>
   </p:transition>
   <p:timing>
     <p:tnLst>
       <p:par>
-        <p:cTn xmlns:p14="http://schemas.microsoft.com/office/powerpoint/2010/main" id="1" dur="indefinite" restart="never" nodeType="tmRoot"/>
+        <p:cTn id="1" dur="indefinite" restart="never" nodeType="tmRoot"/>
       </p:par>
     </p:tnLst>
   </p:timing>

</xml_diff>